<commit_message>
Add Galen to title slide
</commit_message>
<xml_diff>
--- a/slides/HotI-2011/2011-HotI-CCI-OLCF.pptx
+++ b/slides/HotI-2011/2011-HotI-CCI-OLCF.pptx
@@ -2234,12 +2234,259 @@
         <p:spPr>
           <a:xfrm>
             <a:off x="6248400" y="3061150"/>
-            <a:ext cx="2743200" cy="998735"/>
+            <a:ext cx="2743200" cy="644279"/>
           </a:xfrm>
         </p:spPr>
         <p:txBody>
           <a:bodyPr/>
           <a:lstStyle/>
+          <a:p>
+            <a:pPr>
+              <a:spcBef>
+                <a:spcPts val="600"/>
+              </a:spcBef>
+            </a:pPr>
+            <a:r>
+              <a:rPr lang="en-US" dirty="0"/>
+              <a:t>Galen Shipman</a:t>
+            </a:r>
+          </a:p>
+          <a:p>
+            <a:pPr>
+              <a:spcBef>
+                <a:spcPts val="600"/>
+              </a:spcBef>
+            </a:pPr>
+            <a:r>
+              <a:rPr lang="en-US" sz="1600" b="0" dirty="0"/>
+              <a:t>Technology Integration</a:t>
+            </a:r>
+            <a:endParaRPr lang="en-US" sz="1600" b="0" dirty="0"/>
+          </a:p>
+        </p:txBody>
+      </p:sp>
+      <p:sp>
+        <p:nvSpPr>
+          <p:cNvPr id="4" name="Subtitle 2"/>
+          <p:cNvSpPr txBox="1">
+            <a:spLocks/>
+          </p:cNvSpPr>
+          <p:nvPr/>
+        </p:nvSpPr>
+        <p:spPr>
+          <a:xfrm>
+            <a:off x="6254265" y="1269451"/>
+            <a:ext cx="2743200" cy="998735"/>
+          </a:xfrm>
+          <a:prstGeom prst="rect">
+            <a:avLst/>
+          </a:prstGeom>
+        </p:spPr>
+        <p:txBody>
+          <a:bodyPr vert="horz" wrap="square" lIns="91440" tIns="45720" rIns="91440" bIns="45720" rtlCol="0">
+            <a:spAutoFit/>
+          </a:bodyPr>
+          <a:lstStyle>
+            <a:lvl1pPr marL="0" indent="0" algn="r" defTabSz="914400" rtl="0" eaLnBrk="1" latinLnBrk="0" hangingPunct="1">
+              <a:lnSpc>
+                <a:spcPct val="90000"/>
+              </a:lnSpc>
+              <a:spcBef>
+                <a:spcPts val="1400"/>
+              </a:spcBef>
+              <a:buClr>
+                <a:schemeClr val="tx1">
+                  <a:lumMod val="75000"/>
+                  <a:lumOff val="25000"/>
+                </a:schemeClr>
+              </a:buClr>
+              <a:buFont typeface="Arial" pitchFamily="34" charset="0"/>
+              <a:buNone/>
+              <a:defRPr sz="1800" b="1" kern="1200">
+                <a:solidFill>
+                  <a:schemeClr val="tx1">
+                    <a:lumMod val="75000"/>
+                    <a:lumOff val="25000"/>
+                  </a:schemeClr>
+                </a:solidFill>
+                <a:latin typeface="Arial Narrow" pitchFamily="34" charset="0"/>
+                <a:ea typeface="+mn-ea"/>
+                <a:cs typeface="+mn-cs"/>
+              </a:defRPr>
+            </a:lvl1pPr>
+            <a:lvl2pPr marL="457200" indent="0" algn="ctr" defTabSz="914400" rtl="0" eaLnBrk="1" latinLnBrk="0" hangingPunct="1">
+              <a:lnSpc>
+                <a:spcPct val="90000"/>
+              </a:lnSpc>
+              <a:spcBef>
+                <a:spcPts val="800"/>
+              </a:spcBef>
+              <a:buClr>
+                <a:schemeClr val="tx1">
+                  <a:lumMod val="75000"/>
+                  <a:lumOff val="25000"/>
+                </a:schemeClr>
+              </a:buClr>
+              <a:buFont typeface="Arial" pitchFamily="34" charset="0"/>
+              <a:buNone/>
+              <a:defRPr sz="2400" b="0" kern="1200">
+                <a:solidFill>
+                  <a:schemeClr val="tx1">
+                    <a:tint val="75000"/>
+                  </a:schemeClr>
+                </a:solidFill>
+                <a:latin typeface="Arial Narrow" pitchFamily="34" charset="0"/>
+                <a:ea typeface="+mn-ea"/>
+                <a:cs typeface="+mn-cs"/>
+              </a:defRPr>
+            </a:lvl2pPr>
+            <a:lvl3pPr marL="914400" indent="0" algn="ctr" defTabSz="914400" rtl="0" eaLnBrk="1" latinLnBrk="0" hangingPunct="1">
+              <a:lnSpc>
+                <a:spcPct val="90000"/>
+              </a:lnSpc>
+              <a:spcBef>
+                <a:spcPts val="800"/>
+              </a:spcBef>
+              <a:buClr>
+                <a:schemeClr val="tx1">
+                  <a:lumMod val="75000"/>
+                  <a:lumOff val="25000"/>
+                </a:schemeClr>
+              </a:buClr>
+              <a:buFont typeface="Arial" pitchFamily="34" charset="0"/>
+              <a:buNone/>
+              <a:defRPr sz="2000" b="0" kern="1200">
+                <a:solidFill>
+                  <a:schemeClr val="tx1">
+                    <a:tint val="75000"/>
+                  </a:schemeClr>
+                </a:solidFill>
+                <a:latin typeface="Arial Narrow" pitchFamily="34" charset="0"/>
+                <a:ea typeface="+mn-ea"/>
+                <a:cs typeface="+mn-cs"/>
+              </a:defRPr>
+            </a:lvl3pPr>
+            <a:lvl4pPr marL="1371600" indent="0" algn="ctr" defTabSz="914400" rtl="0" eaLnBrk="1" latinLnBrk="0" hangingPunct="1">
+              <a:lnSpc>
+                <a:spcPct val="90000"/>
+              </a:lnSpc>
+              <a:spcBef>
+                <a:spcPts val="800"/>
+              </a:spcBef>
+              <a:buClr>
+                <a:schemeClr val="tx1">
+                  <a:lumMod val="75000"/>
+                  <a:lumOff val="25000"/>
+                </a:schemeClr>
+              </a:buClr>
+              <a:buFont typeface="Arial" pitchFamily="34" charset="0"/>
+              <a:buNone/>
+              <a:defRPr sz="1800" b="0" kern="1200">
+                <a:solidFill>
+                  <a:schemeClr val="tx1">
+                    <a:tint val="75000"/>
+                  </a:schemeClr>
+                </a:solidFill>
+                <a:latin typeface="Arial Narrow" pitchFamily="34" charset="0"/>
+                <a:ea typeface="+mn-ea"/>
+                <a:cs typeface="+mn-cs"/>
+              </a:defRPr>
+            </a:lvl4pPr>
+            <a:lvl5pPr marL="1828800" indent="0" algn="ctr" defTabSz="914400" rtl="0" eaLnBrk="1" latinLnBrk="0" hangingPunct="1">
+              <a:lnSpc>
+                <a:spcPct val="90000"/>
+              </a:lnSpc>
+              <a:spcBef>
+                <a:spcPts val="600"/>
+              </a:spcBef>
+              <a:buClr>
+                <a:schemeClr val="tx1">
+                  <a:lumMod val="75000"/>
+                  <a:lumOff val="25000"/>
+                </a:schemeClr>
+              </a:buClr>
+              <a:buFont typeface="Arial" pitchFamily="34" charset="0"/>
+              <a:buNone/>
+              <a:defRPr sz="1800" b="0" kern="1200">
+                <a:solidFill>
+                  <a:schemeClr val="tx1">
+                    <a:tint val="75000"/>
+                  </a:schemeClr>
+                </a:solidFill>
+                <a:latin typeface="Arial Narrow" pitchFamily="34" charset="0"/>
+                <a:ea typeface="+mn-ea"/>
+                <a:cs typeface="+mn-cs"/>
+              </a:defRPr>
+            </a:lvl5pPr>
+            <a:lvl6pPr marL="2286000" indent="0" algn="ctr" defTabSz="914400" rtl="0" eaLnBrk="1" latinLnBrk="0" hangingPunct="1">
+              <a:spcBef>
+                <a:spcPct val="20000"/>
+              </a:spcBef>
+              <a:buFont typeface="Arial" pitchFamily="34" charset="0"/>
+              <a:buNone/>
+              <a:defRPr sz="2000" kern="1200">
+                <a:solidFill>
+                  <a:schemeClr val="tx1">
+                    <a:tint val="75000"/>
+                  </a:schemeClr>
+                </a:solidFill>
+                <a:latin typeface="+mn-lt"/>
+                <a:ea typeface="+mn-ea"/>
+                <a:cs typeface="+mn-cs"/>
+              </a:defRPr>
+            </a:lvl6pPr>
+            <a:lvl7pPr marL="2743200" indent="0" algn="ctr" defTabSz="914400" rtl="0" eaLnBrk="1" latinLnBrk="0" hangingPunct="1">
+              <a:spcBef>
+                <a:spcPct val="20000"/>
+              </a:spcBef>
+              <a:buFont typeface="Arial" pitchFamily="34" charset="0"/>
+              <a:buNone/>
+              <a:defRPr sz="2000" kern="1200">
+                <a:solidFill>
+                  <a:schemeClr val="tx1">
+                    <a:tint val="75000"/>
+                  </a:schemeClr>
+                </a:solidFill>
+                <a:latin typeface="+mn-lt"/>
+                <a:ea typeface="+mn-ea"/>
+                <a:cs typeface="+mn-cs"/>
+              </a:defRPr>
+            </a:lvl7pPr>
+            <a:lvl8pPr marL="3200400" indent="0" algn="ctr" defTabSz="914400" rtl="0" eaLnBrk="1" latinLnBrk="0" hangingPunct="1">
+              <a:spcBef>
+                <a:spcPct val="20000"/>
+              </a:spcBef>
+              <a:buFont typeface="Arial" pitchFamily="34" charset="0"/>
+              <a:buNone/>
+              <a:defRPr sz="2000" kern="1200">
+                <a:solidFill>
+                  <a:schemeClr val="tx1">
+                    <a:tint val="75000"/>
+                  </a:schemeClr>
+                </a:solidFill>
+                <a:latin typeface="+mn-lt"/>
+                <a:ea typeface="+mn-ea"/>
+                <a:cs typeface="+mn-cs"/>
+              </a:defRPr>
+            </a:lvl8pPr>
+            <a:lvl9pPr marL="3657600" indent="0" algn="ctr" defTabSz="914400" rtl="0" eaLnBrk="1" latinLnBrk="0" hangingPunct="1">
+              <a:spcBef>
+                <a:spcPct val="20000"/>
+              </a:spcBef>
+              <a:buFont typeface="Arial" pitchFamily="34" charset="0"/>
+              <a:buNone/>
+              <a:defRPr sz="2000" kern="1200">
+                <a:solidFill>
+                  <a:schemeClr val="tx1">
+                    <a:tint val="75000"/>
+                  </a:schemeClr>
+                </a:solidFill>
+                <a:latin typeface="+mn-lt"/>
+                <a:ea typeface="+mn-ea"/>
+                <a:cs typeface="+mn-cs"/>
+              </a:defRPr>
+            </a:lvl9pPr>
+          </a:lstStyle>
           <a:p>
             <a:pPr>
               <a:spcBef>

</xml_diff>

<commit_message>
Remove grid lines from last graph
</commit_message>
<xml_diff>
--- a/slides/HotI-2011/2011-HotI-CCI-OLCF.pptx
+++ b/slides/HotI-2011/2011-HotI-CCI-OLCF.pptx
@@ -2261,7 +2261,6 @@
               <a:rPr lang="en-US" sz="1600" b="0" dirty="0"/>
               <a:t>Technology Integration</a:t>
             </a:r>
-            <a:endParaRPr lang="en-US" sz="1600" b="0" dirty="0"/>
           </a:p>
         </p:txBody>
       </p:sp>
@@ -3429,7 +3428,6 @@
               <a:rPr lang="en-US" dirty="0"/>
               <a:t>IBM LAPI and DCMF</a:t>
             </a:r>
-            <a:endParaRPr lang="en-US" dirty="0"/>
           </a:p>
         </p:txBody>
       </p:sp>
@@ -4029,7 +4027,6 @@
               <a:rPr lang="en-US" dirty="0"/>
               <a:t>Conclusion</a:t>
             </a:r>
-            <a:endParaRPr lang="en-US" dirty="0"/>
           </a:p>
         </p:txBody>
       </p:sp>
@@ -4140,11 +4137,7 @@
             <a:pPr lvl="2"/>
             <a:r>
               <a:rPr lang="en-US" dirty="0"/>
-              <a:t>No adittional progress</a:t>
-            </a:r>
-            <a:r>
-              <a:rPr lang="en-US" dirty="0"/>
-              <a:t> until handler completes</a:t>
+              <a:t>No adittional progress until handler completes</a:t>
             </a:r>
           </a:p>
           <a:p>
@@ -4934,84 +4927,9 @@
           <a:chExt cx="0" cy="0"/>
         </a:xfrm>
       </p:grpSpPr>
-      <p:cxnSp>
-        <p:nvCxnSpPr>
-          <p:cNvPr id="5" name="Straight Connector 4"/>
-          <p:cNvCxnSpPr/>
-          <p:nvPr/>
-        </p:nvCxnSpPr>
-        <p:spPr>
-          <a:xfrm flipH="1">
-            <a:off x="1242653" y="3310432"/>
-            <a:ext cx="7200071" cy="0"/>
-          </a:xfrm>
-          <a:prstGeom prst="line">
-            <a:avLst/>
-          </a:prstGeom>
-          <a:ln w="12700" cmpd="sng">
-            <a:solidFill>
-              <a:schemeClr val="tx1">
-                <a:lumMod val="75000"/>
-                <a:lumOff val="25000"/>
-              </a:schemeClr>
-            </a:solidFill>
-            <a:prstDash val="sysDash"/>
-          </a:ln>
-          <a:effectLst/>
-        </p:spPr>
-        <p:style>
-          <a:lnRef idx="2">
-            <a:schemeClr val="accent1"/>
-          </a:lnRef>
-          <a:fillRef idx="0">
-            <a:schemeClr val="accent1"/>
-          </a:fillRef>
-          <a:effectRef idx="1">
-            <a:schemeClr val="accent1"/>
-          </a:effectRef>
-          <a:fontRef idx="minor">
-            <a:schemeClr val="tx1"/>
-          </a:fontRef>
-        </p:style>
-      </p:cxnSp>
-      <p:sp>
-        <p:nvSpPr>
-          <p:cNvPr id="2" name="Title 1"/>
-          <p:cNvSpPr>
-            <a:spLocks noGrp="1"/>
-          </p:cNvSpPr>
-          <p:nvPr>
-            <p:ph type="title"/>
-          </p:nvPr>
-        </p:nvSpPr>
-        <p:spPr>
-          <a:xfrm>
-            <a:off x="111098" y="152400"/>
-            <a:ext cx="8229600" cy="496290"/>
-          </a:xfrm>
-        </p:spPr>
-        <p:txBody>
-          <a:bodyPr/>
-          <a:lstStyle/>
-          <a:p>
-            <a:r>
-              <a:rPr lang="en-US" dirty="0"/>
-              <a:t>Native </a:t>
-            </a:r>
-            <a:r>
-              <a:rPr lang="en-US" dirty="0" err="1"/>
-              <a:t>SeaStar</a:t>
-            </a:r>
-            <a:r>
-              <a:rPr lang="en-US" dirty="0"/>
-              <a:t> Performance</a:t>
-            </a:r>
-          </a:p>
-        </p:txBody>
-      </p:sp>
       <p:pic>
         <p:nvPicPr>
-          <p:cNvPr id="3" name="Picture 2"/>
+          <p:cNvPr id="4" name="Picture 3" descr="pingpong-latency-portals-cci-native.pdf"/>
           <p:cNvPicPr>
             <a:picLocks/>
           </p:cNvPicPr>
@@ -5039,6 +4957,81 @@
           </a:prstGeom>
         </p:spPr>
       </p:pic>
+      <p:cxnSp>
+        <p:nvCxnSpPr>
+          <p:cNvPr id="5" name="Straight Connector 4"/>
+          <p:cNvCxnSpPr/>
+          <p:nvPr/>
+        </p:nvCxnSpPr>
+        <p:spPr>
+          <a:xfrm flipH="1">
+            <a:off x="1242653" y="3310432"/>
+            <a:ext cx="7200071" cy="0"/>
+          </a:xfrm>
+          <a:prstGeom prst="line">
+            <a:avLst/>
+          </a:prstGeom>
+          <a:ln w="12700" cmpd="sng">
+            <a:solidFill>
+              <a:schemeClr val="tx1">
+                <a:lumMod val="75000"/>
+                <a:lumOff val="25000"/>
+              </a:schemeClr>
+            </a:solidFill>
+            <a:prstDash val="sysDash"/>
+          </a:ln>
+          <a:effectLst/>
+        </p:spPr>
+        <p:style>
+          <a:lnRef idx="2">
+            <a:schemeClr val="accent1"/>
+          </a:lnRef>
+          <a:fillRef idx="0">
+            <a:schemeClr val="accent1"/>
+          </a:fillRef>
+          <a:effectRef idx="1">
+            <a:schemeClr val="accent1"/>
+          </a:effectRef>
+          <a:fontRef idx="minor">
+            <a:schemeClr val="tx1"/>
+          </a:fontRef>
+        </p:style>
+      </p:cxnSp>
+      <p:sp>
+        <p:nvSpPr>
+          <p:cNvPr id="2" name="Title 1"/>
+          <p:cNvSpPr>
+            <a:spLocks noGrp="1"/>
+          </p:cNvSpPr>
+          <p:nvPr>
+            <p:ph type="title"/>
+          </p:nvPr>
+        </p:nvSpPr>
+        <p:spPr>
+          <a:xfrm>
+            <a:off x="111098" y="152400"/>
+            <a:ext cx="8229600" cy="496290"/>
+          </a:xfrm>
+        </p:spPr>
+        <p:txBody>
+          <a:bodyPr/>
+          <a:lstStyle/>
+          <a:p>
+            <a:r>
+              <a:rPr lang="en-US" dirty="0"/>
+              <a:t>Native </a:t>
+            </a:r>
+            <a:r>
+              <a:rPr lang="en-US" dirty="0" err="1"/>
+              <a:t>SeaStar</a:t>
+            </a:r>
+            <a:r>
+              <a:rPr lang="en-US" dirty="0"/>
+              <a:t> Performance</a:t>
+            </a:r>
+          </a:p>
+        </p:txBody>
+      </p:sp>
       <p:sp>
         <p:nvSpPr>
           <p:cNvPr id="8" name="TextBox 7"/>
@@ -5106,7 +5099,6 @@
               <a:rPr lang="en-US" dirty="0"/>
               <a:t>CCI/SS may require progress thread</a:t>
             </a:r>
-            <a:endParaRPr lang="en-US" dirty="0"/>
           </a:p>
         </p:txBody>
       </p:sp>
@@ -5393,7 +5385,6 @@
               <a:rPr lang="en-US" dirty="0"/>
               <a:t>Media Streaming (IPTV)</a:t>
             </a:r>
-            <a:endParaRPr lang="en-US" dirty="0"/>
           </a:p>
           <a:p>
             <a:r>

</xml_diff>

<commit_message>
Needs a lot more work, presentation should not be a condensed paper, people will fall asleep. We need to work on it tonight, together.
</commit_message>
<xml_diff>
--- a/slides/HotI-2011/2011-HotI-CCI-OLCF.pptx
+++ b/slides/HotI-2011/2011-HotI-CCI-OLCF.pptx
@@ -5,36 +5,37 @@
     <p:sldMasterId id="2147483915" r:id="rId1"/>
   </p:sldMasterIdLst>
   <p:notesMasterIdLst>
-    <p:notesMasterId r:id="rId29"/>
+    <p:notesMasterId r:id="rId30"/>
   </p:notesMasterIdLst>
   <p:sldIdLst>
     <p:sldId id="275" r:id="rId2"/>
     <p:sldId id="276" r:id="rId3"/>
-    <p:sldId id="277" r:id="rId4"/>
-    <p:sldId id="300" r:id="rId5"/>
-    <p:sldId id="301" r:id="rId6"/>
-    <p:sldId id="302" r:id="rId7"/>
-    <p:sldId id="279" r:id="rId8"/>
-    <p:sldId id="280" r:id="rId9"/>
-    <p:sldId id="281" r:id="rId10"/>
-    <p:sldId id="282" r:id="rId11"/>
-    <p:sldId id="283" r:id="rId12"/>
-    <p:sldId id="284" r:id="rId13"/>
-    <p:sldId id="285" r:id="rId14"/>
-    <p:sldId id="286" r:id="rId15"/>
-    <p:sldId id="287" r:id="rId16"/>
-    <p:sldId id="288" r:id="rId17"/>
-    <p:sldId id="289" r:id="rId18"/>
-    <p:sldId id="290" r:id="rId19"/>
-    <p:sldId id="291" r:id="rId20"/>
-    <p:sldId id="292" r:id="rId21"/>
-    <p:sldId id="293" r:id="rId22"/>
-    <p:sldId id="294" r:id="rId23"/>
-    <p:sldId id="295" r:id="rId24"/>
-    <p:sldId id="296" r:id="rId25"/>
-    <p:sldId id="297" r:id="rId26"/>
-    <p:sldId id="298" r:id="rId27"/>
-    <p:sldId id="299" r:id="rId28"/>
+    <p:sldId id="303" r:id="rId4"/>
+    <p:sldId id="304" r:id="rId5"/>
+    <p:sldId id="300" r:id="rId6"/>
+    <p:sldId id="301" r:id="rId7"/>
+    <p:sldId id="302" r:id="rId8"/>
+    <p:sldId id="279" r:id="rId9"/>
+    <p:sldId id="280" r:id="rId10"/>
+    <p:sldId id="281" r:id="rId11"/>
+    <p:sldId id="282" r:id="rId12"/>
+    <p:sldId id="283" r:id="rId13"/>
+    <p:sldId id="284" r:id="rId14"/>
+    <p:sldId id="285" r:id="rId15"/>
+    <p:sldId id="286" r:id="rId16"/>
+    <p:sldId id="287" r:id="rId17"/>
+    <p:sldId id="288" r:id="rId18"/>
+    <p:sldId id="289" r:id="rId19"/>
+    <p:sldId id="290" r:id="rId20"/>
+    <p:sldId id="291" r:id="rId21"/>
+    <p:sldId id="292" r:id="rId22"/>
+    <p:sldId id="293" r:id="rId23"/>
+    <p:sldId id="294" r:id="rId24"/>
+    <p:sldId id="295" r:id="rId25"/>
+    <p:sldId id="296" r:id="rId26"/>
+    <p:sldId id="297" r:id="rId27"/>
+    <p:sldId id="298" r:id="rId28"/>
+    <p:sldId id="299" r:id="rId29"/>
   </p:sldIdLst>
   <p:sldSz cx="9144000" cy="6858000" type="screen4x3"/>
   <p:notesSz cx="7010400" cy="9296400"/>
@@ -249,7 +250,7 @@
             <a:fld id="{1507BF42-67CC-4FB8-9955-9A9591B56F2B}" type="datetimeFigureOut">
               <a:rPr lang="en-US" smtClean="0"/>
               <a:pPr/>
-              <a:t>8/22/11</a:t>
+              <a:t>8/23/2011</a:t>
             </a:fld>
             <a:endParaRPr lang="en-US"/>
           </a:p>
@@ -518,6 +519,107 @@
     </a:lvl9pPr>
   </p:notesStyle>
 </p:notesMaster>
+</file>
+
+<file path=ppt/notesSlides/notesSlide1.xml><?xml version="1.0" encoding="utf-8"?>
+<p:notes xmlns:a="http://schemas.openxmlformats.org/drawingml/2006/main" xmlns:r="http://schemas.openxmlformats.org/officeDocument/2006/relationships" xmlns:p="http://schemas.openxmlformats.org/presentationml/2006/main">
+  <p:cSld>
+    <p:spTree>
+      <p:nvGrpSpPr>
+        <p:cNvPr id="1" name=""/>
+        <p:cNvGrpSpPr/>
+        <p:nvPr/>
+      </p:nvGrpSpPr>
+      <p:grpSpPr>
+        <a:xfrm>
+          <a:off x="0" y="0"/>
+          <a:ext cx="0" cy="0"/>
+          <a:chOff x="0" y="0"/>
+          <a:chExt cx="0" cy="0"/>
+        </a:xfrm>
+      </p:grpSpPr>
+      <p:sp>
+        <p:nvSpPr>
+          <p:cNvPr id="2" name="Slide Image Placeholder 1"/>
+          <p:cNvSpPr>
+            <a:spLocks noGrp="1" noRot="1" noChangeAspect="1"/>
+          </p:cNvSpPr>
+          <p:nvPr>
+            <p:ph type="sldImg"/>
+          </p:nvPr>
+        </p:nvSpPr>
+        <p:spPr/>
+      </p:sp>
+      <p:sp>
+        <p:nvSpPr>
+          <p:cNvPr id="3" name="Notes Placeholder 2"/>
+          <p:cNvSpPr>
+            <a:spLocks noGrp="1"/>
+          </p:cNvSpPr>
+          <p:nvPr>
+            <p:ph type="body" idx="1"/>
+          </p:nvPr>
+        </p:nvSpPr>
+        <p:spPr/>
+        <p:txBody>
+          <a:bodyPr/>
+          <a:lstStyle/>
+          <a:p>
+            <a:r>
+              <a:rPr lang="en-US" dirty="0" smtClean="0"/>
+              <a:t>I would stick</a:t>
+            </a:r>
+            <a:r>
+              <a:rPr lang="en-US" baseline="0" dirty="0" smtClean="0"/>
+              <a:t> to one slide for Socket an one for MPI, focusing on semantic differences. I would not present the various specialized ones, just one to show the semantic differences (matching, </a:t>
+            </a:r>
+            <a:r>
+              <a:rPr lang="en-US" baseline="0" dirty="0" err="1" smtClean="0"/>
+              <a:t>etc</a:t>
+            </a:r>
+            <a:r>
+              <a:rPr lang="en-US" baseline="0" smtClean="0"/>
+              <a:t>).</a:t>
+            </a:r>
+            <a:endParaRPr lang="en-US"/>
+          </a:p>
+        </p:txBody>
+      </p:sp>
+      <p:sp>
+        <p:nvSpPr>
+          <p:cNvPr id="4" name="Slide Number Placeholder 3"/>
+          <p:cNvSpPr>
+            <a:spLocks noGrp="1"/>
+          </p:cNvSpPr>
+          <p:nvPr>
+            <p:ph type="sldNum" sz="quarter" idx="10"/>
+          </p:nvPr>
+        </p:nvSpPr>
+        <p:spPr/>
+        <p:txBody>
+          <a:bodyPr/>
+          <a:lstStyle/>
+          <a:p>
+            <a:fld id="{A3588623-9414-4A4F-B728-DDF491331B9F}" type="slidenum">
+              <a:rPr lang="en-US" smtClean="0"/>
+              <a:pPr/>
+              <a:t>8</a:t>
+            </a:fld>
+            <a:endParaRPr lang="en-US"/>
+          </a:p>
+        </p:txBody>
+      </p:sp>
+    </p:spTree>
+    <p:extLst>
+      <p:ext uri="{BB962C8B-B14F-4D97-AF65-F5344CB8AC3E}">
+        <p14:creationId xmlns:p14="http://schemas.microsoft.com/office/powerpoint/2010/main" val="2120181062"/>
+      </p:ext>
+    </p:extLst>
+  </p:cSld>
+  <p:clrMapOvr>
+    <a:masterClrMapping/>
+  </p:clrMapOvr>
+</p:notes>
 </file>
 
 <file path=ppt/slideLayouts/slideLayout1.xml><?xml version="1.0" encoding="utf-8"?>
@@ -2534,7 +2636,7 @@
   <p:timing>
     <p:tnLst>
       <p:par>
-        <p:cTn xmlns:p14="http://schemas.microsoft.com/office/powerpoint/2010/main" id="1" dur="indefinite" restart="never" nodeType="tmRoot"/>
+        <p:cTn id="1" dur="indefinite" restart="never" nodeType="tmRoot"/>
       </p:par>
     </p:tnLst>
   </p:timing>
@@ -2597,8 +2699,8 @@
         </p:nvSpPr>
         <p:spPr>
           <a:xfrm>
-            <a:off x="111204" y="1344823"/>
-            <a:ext cx="8229600" cy="5584094"/>
+            <a:off x="111204" y="1143000"/>
+            <a:ext cx="8229600" cy="5395809"/>
           </a:xfrm>
         </p:spPr>
         <p:txBody>
@@ -2606,70 +2708,96 @@
           <a:lstStyle/>
           <a:p>
             <a:r>
-              <a:rPr lang="en-US" dirty="0"/>
-              <a:t>Point-to-point communication use two modes</a:t>
-            </a:r>
-          </a:p>
-          <a:p>
-            <a:pPr lvl="1"/>
-            <a:r>
-              <a:rPr lang="en-US" dirty="0"/>
-              <a:t>Eager and Rendezvous</a:t>
-            </a:r>
-          </a:p>
-          <a:p>
-            <a:r>
-              <a:rPr lang="en-US" dirty="0"/>
-              <a:t>Each MPI switches modes at different sizes depending on the network being used</a:t>
-            </a:r>
-          </a:p>
-          <a:p>
-            <a:pPr lvl="1"/>
-            <a:r>
-              <a:rPr lang="en-US" dirty="0"/>
-              <a:t>May be tunable, but users don’t want to tune</a:t>
-            </a:r>
-          </a:p>
-          <a:p>
-            <a:pPr lvl="1"/>
-            <a:r>
-              <a:rPr lang="en-US" dirty="0"/>
-              <a:t>May lead to buffer overruns or OOM on the receiver</a:t>
-            </a:r>
-          </a:p>
-          <a:p>
-            <a:r>
-              <a:rPr lang="en-US" dirty="0"/>
-              <a:t>Does not specify underlying network protocol</a:t>
-            </a:r>
-          </a:p>
-          <a:p>
-            <a:r>
-              <a:rPr lang="en-US" dirty="0"/>
-              <a:t>Each MPI implements a NAL</a:t>
-            </a:r>
-          </a:p>
-          <a:p>
-            <a:r>
-              <a:rPr lang="en-US" dirty="0"/>
-              <a:t>Less mature than Sockets</a:t>
-            </a:r>
-          </a:p>
-          <a:p>
-            <a:r>
-              <a:rPr lang="en-US" dirty="0"/>
-              <a:t>Well-defined standard (but implementations vary)</a:t>
-            </a:r>
-          </a:p>
-          <a:p>
-            <a:endParaRPr lang="en-US" dirty="0"/>
+              <a:rPr lang="en-US" sz="2400" dirty="0"/>
+              <a:t>Dominant interface in HPC</a:t>
+            </a:r>
+          </a:p>
+          <a:p>
+            <a:r>
+              <a:rPr lang="en-US" sz="2400" dirty="0"/>
+              <a:t>Provides scalability</a:t>
+            </a:r>
+          </a:p>
+          <a:p>
+            <a:r>
+              <a:rPr lang="en-US" sz="2400" dirty="0"/>
+              <a:t>Rich API (i.e. complicated)</a:t>
+            </a:r>
+          </a:p>
+          <a:p>
+            <a:r>
+              <a:rPr lang="en-US" sz="2400" dirty="0"/>
+              <a:t>Point-to-point, collective, and one-sided</a:t>
+            </a:r>
+          </a:p>
+          <a:p>
+            <a:r>
+              <a:rPr lang="en-US" sz="2400" dirty="0"/>
+              <a:t>Blocking and non-blocking</a:t>
+            </a:r>
+          </a:p>
+          <a:p>
+            <a:r>
+              <a:rPr lang="en-US" sz="2400" dirty="0"/>
+              <a:t>Synchronous, asynchronous, and ready modes</a:t>
+            </a:r>
+          </a:p>
+          <a:p>
+            <a:r>
+              <a:rPr lang="en-US" sz="2400" dirty="0"/>
+              <a:t>Uses communication groups (communicators)</a:t>
+            </a:r>
+          </a:p>
+          <a:p>
+            <a:pPr lvl="1"/>
+            <a:r>
+              <a:rPr lang="en-US" sz="2100" dirty="0"/>
+              <a:t>May include all process or a subset of processes</a:t>
+            </a:r>
+          </a:p>
+          <a:p>
+            <a:r>
+              <a:rPr lang="en-US" sz="2400" dirty="0"/>
+              <a:t>Does provide a notion of dynamic process management</a:t>
+            </a:r>
+          </a:p>
+          <a:p>
+            <a:pPr lvl="1"/>
+            <a:r>
+              <a:rPr lang="en-US" sz="2100" dirty="0" err="1"/>
+              <a:t>Accept</a:t>
+            </a:r>
+            <a:r>
+              <a:rPr lang="en-US" sz="2100" dirty="0"/>
+              <a:t>(), </a:t>
+            </a:r>
+            <a:r>
+              <a:rPr lang="en-US" sz="2100" dirty="0" err="1"/>
+              <a:t>Connect</a:t>
+            </a:r>
+            <a:r>
+              <a:rPr lang="en-US" sz="2100" dirty="0"/>
+              <a:t>() immature, infrequently provided, and much less used</a:t>
+            </a:r>
+          </a:p>
+          <a:p>
+            <a:pPr lvl="1"/>
+            <a:r>
+              <a:rPr lang="en-US" sz="2100" dirty="0"/>
+              <a:t>Imposes high overhead, not </a:t>
+            </a:r>
+            <a:r>
+              <a:rPr lang="en-US" sz="2100" dirty="0" err="1"/>
+              <a:t>performant</a:t>
+            </a:r>
+            <a:endParaRPr lang="en-US" sz="2100" dirty="0"/>
           </a:p>
         </p:txBody>
       </p:sp>
     </p:spTree>
     <p:extLst>
       <p:ext uri="{BB962C8B-B14F-4D97-AF65-F5344CB8AC3E}">
-        <p14:creationId xmlns:p14="http://schemas.microsoft.com/office/powerpoint/2010/main" val="3082596601"/>
+        <p14:creationId xmlns:p14="http://schemas.microsoft.com/office/powerpoint/2010/main" val="2790947775"/>
       </p:ext>
     </p:extLst>
   </p:cSld>
@@ -2679,7 +2807,7 @@
   <p:timing>
     <p:tnLst>
       <p:par>
-        <p:cTn xmlns:p14="http://schemas.microsoft.com/office/powerpoint/2010/main" id="1" dur="indefinite" restart="never" nodeType="tmRoot"/>
+        <p:cTn id="1" dur="indefinite" restart="never" nodeType="tmRoot"/>
       </p:par>
     </p:tnLst>
   </p:timing>
@@ -2743,7 +2871,7 @@
         <p:spPr>
           <a:xfrm>
             <a:off x="111204" y="1344823"/>
-            <a:ext cx="8229600" cy="2871555"/>
+            <a:ext cx="8229600" cy="5584094"/>
           </a:xfrm>
         </p:spPr>
         <p:txBody>
@@ -2752,48 +2880,69 @@
           <a:p>
             <a:r>
               <a:rPr lang="en-US" dirty="0"/>
-              <a:t>Rigid fault model</a:t>
-            </a:r>
-          </a:p>
-          <a:p>
-            <a:pPr lvl="1"/>
-            <a:r>
-              <a:rPr lang="en-US" dirty="0"/>
-              <a:t>Default mode is all errors trigger abort</a:t>
-            </a:r>
-          </a:p>
-          <a:p>
-            <a:pPr lvl="1"/>
-            <a:r>
-              <a:rPr lang="en-US" dirty="0"/>
-              <a:t>Optionally may have errors return</a:t>
-            </a:r>
-          </a:p>
-          <a:p>
-            <a:pPr lvl="2"/>
-            <a:r>
-              <a:rPr lang="en-US" dirty="0"/>
-              <a:t>Not clear how to handle missing peers</a:t>
-            </a:r>
-          </a:p>
-          <a:p>
-            <a:r>
-              <a:rPr lang="en-US" dirty="0"/>
-              <a:t>Assumes reliable delivery</a:t>
-            </a:r>
-          </a:p>
-          <a:p>
-            <a:r>
-              <a:rPr lang="en-US" dirty="0"/>
-              <a:t>Requires ordered matching, but not ordered completion</a:t>
-            </a:r>
+              <a:t>Point-to-point communication use two modes</a:t>
+            </a:r>
+          </a:p>
+          <a:p>
+            <a:pPr lvl="1"/>
+            <a:r>
+              <a:rPr lang="en-US" dirty="0"/>
+              <a:t>Eager and Rendezvous</a:t>
+            </a:r>
+          </a:p>
+          <a:p>
+            <a:r>
+              <a:rPr lang="en-US" dirty="0"/>
+              <a:t>Each MPI switches modes at different sizes depending on the network being used</a:t>
+            </a:r>
+          </a:p>
+          <a:p>
+            <a:pPr lvl="1"/>
+            <a:r>
+              <a:rPr lang="en-US" dirty="0"/>
+              <a:t>May be tunable, but users don’t want to tune</a:t>
+            </a:r>
+          </a:p>
+          <a:p>
+            <a:pPr lvl="1"/>
+            <a:r>
+              <a:rPr lang="en-US" dirty="0"/>
+              <a:t>May lead to buffer overruns or OOM on the receiver</a:t>
+            </a:r>
+          </a:p>
+          <a:p>
+            <a:r>
+              <a:rPr lang="en-US" dirty="0"/>
+              <a:t>Does not specify underlying network protocol</a:t>
+            </a:r>
+          </a:p>
+          <a:p>
+            <a:r>
+              <a:rPr lang="en-US" dirty="0"/>
+              <a:t>Each MPI implements a NAL</a:t>
+            </a:r>
+          </a:p>
+          <a:p>
+            <a:r>
+              <a:rPr lang="en-US" dirty="0"/>
+              <a:t>Less mature than Sockets</a:t>
+            </a:r>
+          </a:p>
+          <a:p>
+            <a:r>
+              <a:rPr lang="en-US" dirty="0"/>
+              <a:t>Well-defined standard (but implementations vary)</a:t>
+            </a:r>
+          </a:p>
+          <a:p>
+            <a:endParaRPr lang="en-US" dirty="0"/>
           </a:p>
         </p:txBody>
       </p:sp>
     </p:spTree>
     <p:extLst>
       <p:ext uri="{BB962C8B-B14F-4D97-AF65-F5344CB8AC3E}">
-        <p14:creationId xmlns:p14="http://schemas.microsoft.com/office/powerpoint/2010/main" val="4166895635"/>
+        <p14:creationId xmlns:p14="http://schemas.microsoft.com/office/powerpoint/2010/main" val="3082596601"/>
       </p:ext>
     </p:extLst>
   </p:cSld>
@@ -2803,7 +2952,7 @@
   <p:timing>
     <p:tnLst>
       <p:par>
-        <p:cTn xmlns:p14="http://schemas.microsoft.com/office/powerpoint/2010/main" id="1" dur="indefinite" restart="never" nodeType="tmRoot"/>
+        <p:cTn id="1" dur="indefinite" restart="never" nodeType="tmRoot"/>
       </p:par>
     </p:tnLst>
   </p:timing>
@@ -2849,7 +2998,7 @@
           <a:p>
             <a:r>
               <a:rPr lang="en-US" dirty="0"/>
-              <a:t>Specialized APIs</a:t>
+              <a:t>MPI</a:t>
             </a:r>
           </a:p>
         </p:txBody>
@@ -2867,7 +3016,7 @@
         <p:spPr>
           <a:xfrm>
             <a:off x="111204" y="1344823"/>
-            <a:ext cx="8229600" cy="4458656"/>
+            <a:ext cx="8229600" cy="2871555"/>
           </a:xfrm>
         </p:spPr>
         <p:txBody>
@@ -2876,62 +3025,40 @@
           <a:p>
             <a:r>
               <a:rPr lang="en-US" dirty="0"/>
-              <a:t>OFA Verbs</a:t>
-            </a:r>
-          </a:p>
-          <a:p>
-            <a:r>
-              <a:rPr lang="en-US" dirty="0"/>
-              <a:t>Cray/Sandia’s Portals</a:t>
-            </a:r>
-          </a:p>
-          <a:p>
-            <a:r>
-              <a:rPr lang="en-US" dirty="0" err="1"/>
-              <a:t>Qlogics’s</a:t>
-            </a:r>
-            <a:r>
-              <a:rPr lang="en-US" dirty="0"/>
-              <a:t> PSM</a:t>
-            </a:r>
-          </a:p>
-          <a:p>
-            <a:r>
-              <a:rPr lang="en-US" dirty="0" err="1"/>
-              <a:t>Myricom’s</a:t>
-            </a:r>
-            <a:r>
-              <a:rPr lang="en-US" dirty="0"/>
-              <a:t> MX</a:t>
-            </a:r>
-          </a:p>
-          <a:p>
-            <a:r>
-              <a:rPr lang="en-US" dirty="0"/>
-              <a:t>LBL’s </a:t>
-            </a:r>
-            <a:r>
-              <a:rPr lang="en-US" dirty="0" err="1"/>
-              <a:t>GASnet</a:t>
-            </a:r>
-            <a:endParaRPr lang="en-US" dirty="0"/>
-          </a:p>
-          <a:p>
-            <a:r>
-              <a:rPr lang="en-US" dirty="0"/>
-              <a:t>DAPL</a:t>
-            </a:r>
-          </a:p>
-          <a:p>
-            <a:r>
-              <a:rPr lang="en-US" dirty="0"/>
-              <a:t>IBM’s LAPI and DCMF</a:t>
-            </a:r>
-          </a:p>
-          <a:p>
-            <a:r>
-              <a:rPr lang="en-US" dirty="0"/>
-              <a:t>Others</a:t>
+              <a:t>Rigid fault model</a:t>
+            </a:r>
+          </a:p>
+          <a:p>
+            <a:pPr lvl="1"/>
+            <a:r>
+              <a:rPr lang="en-US" dirty="0"/>
+              <a:t>Default mode is all errors trigger abort</a:t>
+            </a:r>
+          </a:p>
+          <a:p>
+            <a:pPr lvl="1"/>
+            <a:r>
+              <a:rPr lang="en-US" dirty="0"/>
+              <a:t>Optionally may have errors return</a:t>
+            </a:r>
+          </a:p>
+          <a:p>
+            <a:pPr lvl="2"/>
+            <a:r>
+              <a:rPr lang="en-US" dirty="0"/>
+              <a:t>Not clear how to handle missing peers</a:t>
+            </a:r>
+          </a:p>
+          <a:p>
+            <a:r>
+              <a:rPr lang="en-US" dirty="0"/>
+              <a:t>Assumes reliable delivery</a:t>
+            </a:r>
+          </a:p>
+          <a:p>
+            <a:r>
+              <a:rPr lang="en-US" dirty="0"/>
+              <a:t>Requires ordered matching, but not ordered completion</a:t>
             </a:r>
           </a:p>
         </p:txBody>
@@ -2939,7 +3066,7 @@
     </p:spTree>
     <p:extLst>
       <p:ext uri="{BB962C8B-B14F-4D97-AF65-F5344CB8AC3E}">
-        <p14:creationId xmlns:p14="http://schemas.microsoft.com/office/powerpoint/2010/main" val="3718705044"/>
+        <p14:creationId xmlns:p14="http://schemas.microsoft.com/office/powerpoint/2010/main" val="4166895635"/>
       </p:ext>
     </p:extLst>
   </p:cSld>
@@ -2949,7 +3076,7 @@
   <p:timing>
     <p:tnLst>
       <p:par>
-        <p:cTn xmlns:p14="http://schemas.microsoft.com/office/powerpoint/2010/main" id="1" dur="indefinite" restart="never" nodeType="tmRoot"/>
+        <p:cTn id="1" dur="indefinite" restart="never" nodeType="tmRoot"/>
       </p:par>
     </p:tnLst>
   </p:timing>
@@ -2995,7 +3122,7 @@
           <a:p>
             <a:r>
               <a:rPr lang="en-US" dirty="0"/>
-              <a:t>OFA Verbs</a:t>
+              <a:t>Specialized APIs</a:t>
             </a:r>
           </a:p>
         </p:txBody>
@@ -3012,8 +3139,8 @@
         </p:nvSpPr>
         <p:spPr>
           <a:xfrm>
-            <a:off x="111204" y="1028701"/>
-            <a:ext cx="8229600" cy="5315815"/>
+            <a:off x="111204" y="1344823"/>
+            <a:ext cx="8229600" cy="4458656"/>
           </a:xfrm>
         </p:spPr>
         <p:txBody>
@@ -3021,66 +3148,63 @@
           <a:lstStyle/>
           <a:p>
             <a:r>
-              <a:rPr lang="en-US" sz="2600" dirty="0"/>
-              <a:t>Based on earlier VIA spec</a:t>
-            </a:r>
-          </a:p>
-          <a:p>
-            <a:r>
-              <a:rPr lang="en-US" sz="2600" dirty="0"/>
-              <a:t>Does not specify API, just </a:t>
-            </a:r>
-            <a:r>
-              <a:rPr lang="en-US" sz="2600" i="1" dirty="0"/>
-              <a:t>Verbs</a:t>
-            </a:r>
-          </a:p>
-          <a:p>
-            <a:r>
-              <a:rPr lang="en-US" sz="2600" dirty="0"/>
-              <a:t>Multiple vendor APIs initially</a:t>
-            </a:r>
-          </a:p>
-          <a:p>
-            <a:r>
-              <a:rPr lang="en-US" sz="2600" dirty="0"/>
-              <a:t>Coalesced into Open-Fabrics Association (OFA)</a:t>
-            </a:r>
-          </a:p>
-          <a:p>
-            <a:r>
-              <a:rPr lang="en-US" sz="2600" dirty="0"/>
-              <a:t>Two-sided and one-sided</a:t>
-            </a:r>
-          </a:p>
-          <a:p>
-            <a:r>
-              <a:rPr lang="en-US" sz="2600" dirty="0"/>
-              <a:t>Always asynchronous</a:t>
-            </a:r>
-          </a:p>
-          <a:p>
-            <a:r>
-              <a:rPr lang="en-US" sz="2600" dirty="0"/>
-              <a:t>Reliable and unreliable</a:t>
-            </a:r>
-          </a:p>
-          <a:p>
-            <a:r>
-              <a:rPr lang="en-US" sz="2600" dirty="0"/>
-              <a:t>Connection and connectionless modes</a:t>
-            </a:r>
-          </a:p>
-          <a:p>
-            <a:r>
-              <a:rPr lang="en-US" sz="2600" dirty="0"/>
-              <a:t>Communication requires registered memory</a:t>
-            </a:r>
-          </a:p>
-          <a:p>
-            <a:r>
-              <a:rPr lang="en-US" sz="2600" dirty="0"/>
-              <a:t>Queue-Pair represents logical connection</a:t>
+              <a:rPr lang="en-US" dirty="0"/>
+              <a:t>OFA Verbs</a:t>
+            </a:r>
+          </a:p>
+          <a:p>
+            <a:r>
+              <a:rPr lang="en-US" dirty="0"/>
+              <a:t>Cray/Sandia’s Portals</a:t>
+            </a:r>
+          </a:p>
+          <a:p>
+            <a:r>
+              <a:rPr lang="en-US" dirty="0" err="1"/>
+              <a:t>Qlogics’s</a:t>
+            </a:r>
+            <a:r>
+              <a:rPr lang="en-US" dirty="0"/>
+              <a:t> PSM</a:t>
+            </a:r>
+          </a:p>
+          <a:p>
+            <a:r>
+              <a:rPr lang="en-US" dirty="0" err="1"/>
+              <a:t>Myricom’s</a:t>
+            </a:r>
+            <a:r>
+              <a:rPr lang="en-US" dirty="0"/>
+              <a:t> MX</a:t>
+            </a:r>
+          </a:p>
+          <a:p>
+            <a:r>
+              <a:rPr lang="en-US" dirty="0"/>
+              <a:t>LBL’s </a:t>
+            </a:r>
+            <a:r>
+              <a:rPr lang="en-US" dirty="0" err="1"/>
+              <a:t>GASnet</a:t>
+            </a:r>
+            <a:endParaRPr lang="en-US" dirty="0"/>
+          </a:p>
+          <a:p>
+            <a:r>
+              <a:rPr lang="en-US" dirty="0"/>
+              <a:t>DAPL</a:t>
+            </a:r>
+          </a:p>
+          <a:p>
+            <a:r>
+              <a:rPr lang="en-US" dirty="0"/>
+              <a:t>IBM’s LAPI and DCMF</a:t>
+            </a:r>
+          </a:p>
+          <a:p>
+            <a:r>
+              <a:rPr lang="en-US" dirty="0"/>
+              <a:t>Others</a:t>
             </a:r>
           </a:p>
         </p:txBody>
@@ -3088,7 +3212,7 @@
     </p:spTree>
     <p:extLst>
       <p:ext uri="{BB962C8B-B14F-4D97-AF65-F5344CB8AC3E}">
-        <p14:creationId xmlns:p14="http://schemas.microsoft.com/office/powerpoint/2010/main" val="3144136157"/>
+        <p14:creationId xmlns:p14="http://schemas.microsoft.com/office/powerpoint/2010/main" val="3718705044"/>
       </p:ext>
     </p:extLst>
   </p:cSld>
@@ -3098,7 +3222,7 @@
   <p:timing>
     <p:tnLst>
       <p:par>
-        <p:cTn xmlns:p14="http://schemas.microsoft.com/office/powerpoint/2010/main" id="1" dur="indefinite" restart="never" nodeType="tmRoot"/>
+        <p:cTn id="1" dur="indefinite" restart="never" nodeType="tmRoot"/>
       </p:par>
     </p:tnLst>
   </p:timing>
@@ -3144,7 +3268,7 @@
           <a:p>
             <a:r>
               <a:rPr lang="en-US" dirty="0"/>
-              <a:t>Portals</a:t>
+              <a:t>OFA Verbs</a:t>
             </a:r>
           </a:p>
         </p:txBody>
@@ -3161,8 +3285,8 @@
         </p:nvSpPr>
         <p:spPr>
           <a:xfrm>
-            <a:off x="111204" y="1344823"/>
-            <a:ext cx="8229600" cy="3579441"/>
+            <a:off x="111204" y="1028701"/>
+            <a:ext cx="8229600" cy="5315815"/>
           </a:xfrm>
         </p:spPr>
         <p:txBody>
@@ -3170,51 +3294,66 @@
           <a:lstStyle/>
           <a:p>
             <a:r>
-              <a:rPr lang="en-US" dirty="0"/>
-              <a:t>One-sided (Put/Get)</a:t>
-            </a:r>
-          </a:p>
-          <a:p>
-            <a:r>
-              <a:rPr lang="en-US" dirty="0"/>
-              <a:t>Uses tags to steer messages to buffers</a:t>
-            </a:r>
-          </a:p>
-          <a:p>
-            <a:r>
-              <a:rPr lang="en-US" dirty="0"/>
-              <a:t>Connectionless</a:t>
-            </a:r>
-          </a:p>
-          <a:p>
-            <a:pPr lvl="1"/>
-            <a:r>
-              <a:rPr lang="en-US" dirty="0"/>
-              <a:t>Underlying NALs maintain necessary connection state</a:t>
-            </a:r>
-          </a:p>
-          <a:p>
-            <a:r>
-              <a:rPr lang="en-US" dirty="0"/>
-              <a:t>Most commonly used on large HPC systems</a:t>
-            </a:r>
-          </a:p>
-          <a:p>
-            <a:r>
-              <a:rPr lang="en-US" dirty="0" err="1"/>
-              <a:t>Lustre</a:t>
-            </a:r>
-            <a:r>
-              <a:rPr lang="en-US" dirty="0"/>
-              <a:t> distributed </a:t>
-            </a:r>
-            <a:r>
-              <a:rPr lang="en-US" dirty="0" err="1"/>
-              <a:t>file system</a:t>
-            </a:r>
-            <a:r>
-              <a:rPr lang="en-US" dirty="0"/>
-              <a:t> NAL, LNET, was originally based on Portals</a:t>
+              <a:rPr lang="en-US" sz="2600" dirty="0"/>
+              <a:t>Based on earlier VIA spec</a:t>
+            </a:r>
+          </a:p>
+          <a:p>
+            <a:r>
+              <a:rPr lang="en-US" sz="2600" dirty="0"/>
+              <a:t>Does not specify API, just </a:t>
+            </a:r>
+            <a:r>
+              <a:rPr lang="en-US" sz="2600" i="1" dirty="0"/>
+              <a:t>Verbs</a:t>
+            </a:r>
+          </a:p>
+          <a:p>
+            <a:r>
+              <a:rPr lang="en-US" sz="2600" dirty="0"/>
+              <a:t>Multiple vendor APIs initially</a:t>
+            </a:r>
+          </a:p>
+          <a:p>
+            <a:r>
+              <a:rPr lang="en-US" sz="2600" dirty="0"/>
+              <a:t>Coalesced into Open-Fabrics Association (OFA)</a:t>
+            </a:r>
+          </a:p>
+          <a:p>
+            <a:r>
+              <a:rPr lang="en-US" sz="2600" dirty="0"/>
+              <a:t>Two-sided and one-sided</a:t>
+            </a:r>
+          </a:p>
+          <a:p>
+            <a:r>
+              <a:rPr lang="en-US" sz="2600" dirty="0"/>
+              <a:t>Always asynchronous</a:t>
+            </a:r>
+          </a:p>
+          <a:p>
+            <a:r>
+              <a:rPr lang="en-US" sz="2600" dirty="0"/>
+              <a:t>Reliable and unreliable</a:t>
+            </a:r>
+          </a:p>
+          <a:p>
+            <a:r>
+              <a:rPr lang="en-US" sz="2600" dirty="0"/>
+              <a:t>Connection and connectionless modes</a:t>
+            </a:r>
+          </a:p>
+          <a:p>
+            <a:r>
+              <a:rPr lang="en-US" sz="2600" dirty="0"/>
+              <a:t>Communication requires registered memory</a:t>
+            </a:r>
+          </a:p>
+          <a:p>
+            <a:r>
+              <a:rPr lang="en-US" sz="2600" dirty="0"/>
+              <a:t>Queue-Pair represents logical connection</a:t>
             </a:r>
           </a:p>
         </p:txBody>
@@ -3222,7 +3361,7 @@
     </p:spTree>
     <p:extLst>
       <p:ext uri="{BB962C8B-B14F-4D97-AF65-F5344CB8AC3E}">
-        <p14:creationId xmlns:p14="http://schemas.microsoft.com/office/powerpoint/2010/main" val="3482068955"/>
+        <p14:creationId xmlns:p14="http://schemas.microsoft.com/office/powerpoint/2010/main" val="3144136157"/>
       </p:ext>
     </p:extLst>
   </p:cSld>
@@ -3232,7 +3371,7 @@
   <p:timing>
     <p:tnLst>
       <p:par>
-        <p:cTn xmlns:p14="http://schemas.microsoft.com/office/powerpoint/2010/main" id="1" dur="indefinite" restart="never" nodeType="tmRoot"/>
+        <p:cTn id="1" dur="indefinite" restart="never" nodeType="tmRoot"/>
       </p:par>
     </p:tnLst>
   </p:timing>
@@ -3277,20 +3416,8 @@
           <a:lstStyle/>
           <a:p>
             <a:r>
-              <a:rPr lang="en-US" dirty="0" err="1"/>
-              <a:t>Myricom</a:t>
-            </a:r>
-            <a:r>
-              <a:rPr lang="en-US" dirty="0"/>
-              <a:t> MX and </a:t>
-            </a:r>
-            <a:r>
-              <a:rPr lang="en-US" dirty="0" err="1"/>
-              <a:t>Qlogic</a:t>
-            </a:r>
-            <a:r>
-              <a:rPr lang="en-US" dirty="0"/>
-              <a:t> PSM</a:t>
+              <a:rPr lang="en-US" dirty="0"/>
+              <a:t>Portals</a:t>
             </a:r>
           </a:p>
         </p:txBody>
@@ -3308,7 +3435,7 @@
         <p:spPr>
           <a:xfrm>
             <a:off x="111204" y="1344823"/>
-            <a:ext cx="8229600" cy="4449423"/>
+            <a:ext cx="8229600" cy="3579441"/>
           </a:xfrm>
         </p:spPr>
         <p:txBody>
@@ -3317,52 +3444,50 @@
           <a:p>
             <a:r>
               <a:rPr lang="en-US" dirty="0"/>
-              <a:t>Similar two-sided, matching API</a:t>
-            </a:r>
-          </a:p>
-          <a:p>
-            <a:pPr lvl="1"/>
-            <a:r>
-              <a:rPr lang="en-US" dirty="0"/>
-              <a:t>Designed to support MPI</a:t>
-            </a:r>
-          </a:p>
-          <a:p>
-            <a:r>
-              <a:rPr lang="en-US" dirty="0"/>
-              <a:t>Eager for small messages</a:t>
-            </a:r>
-          </a:p>
-          <a:p>
-            <a:r>
-              <a:rPr lang="en-US" dirty="0"/>
-              <a:t>Zero-copy, rendezvous for large messages</a:t>
-            </a:r>
-          </a:p>
-          <a:p>
-            <a:r>
-              <a:rPr lang="en-US" dirty="0"/>
-              <a:t>Semi-connectionless</a:t>
-            </a:r>
-          </a:p>
-          <a:p>
-            <a:pPr lvl="1"/>
-            <a:r>
-              <a:rPr lang="en-US" dirty="0"/>
-              <a:t>Target does accept connection requests</a:t>
-            </a:r>
-          </a:p>
-          <a:p>
-            <a:pPr lvl="1"/>
-            <a:r>
-              <a:rPr lang="en-US" dirty="0"/>
-              <a:t>Sender connects before sending</a:t>
-            </a:r>
-          </a:p>
-          <a:p>
-            <a:r>
-              <a:rPr lang="en-US" dirty="0"/>
-              <a:t>Reliable, in-order matching with out-of-order completion (like MPI)</a:t>
+              <a:t>One-sided (Put/Get)</a:t>
+            </a:r>
+          </a:p>
+          <a:p>
+            <a:r>
+              <a:rPr lang="en-US" dirty="0"/>
+              <a:t>Uses tags to steer messages to buffers</a:t>
+            </a:r>
+          </a:p>
+          <a:p>
+            <a:r>
+              <a:rPr lang="en-US" dirty="0"/>
+              <a:t>Connectionless</a:t>
+            </a:r>
+          </a:p>
+          <a:p>
+            <a:pPr lvl="1"/>
+            <a:r>
+              <a:rPr lang="en-US" dirty="0"/>
+              <a:t>Underlying NALs maintain necessary connection state</a:t>
+            </a:r>
+          </a:p>
+          <a:p>
+            <a:r>
+              <a:rPr lang="en-US" dirty="0"/>
+              <a:t>Most commonly used on large HPC systems</a:t>
+            </a:r>
+          </a:p>
+          <a:p>
+            <a:r>
+              <a:rPr lang="en-US" dirty="0" err="1"/>
+              <a:t>Lustre</a:t>
+            </a:r>
+            <a:r>
+              <a:rPr lang="en-US" dirty="0"/>
+              <a:t> distributed </a:t>
+            </a:r>
+            <a:r>
+              <a:rPr lang="en-US" dirty="0" err="1"/>
+              <a:t>file system</a:t>
+            </a:r>
+            <a:r>
+              <a:rPr lang="en-US" dirty="0"/>
+              <a:t> NAL, LNET, was originally based on Portals</a:t>
             </a:r>
           </a:p>
         </p:txBody>
@@ -3370,7 +3495,7 @@
     </p:spTree>
     <p:extLst>
       <p:ext uri="{BB962C8B-B14F-4D97-AF65-F5344CB8AC3E}">
-        <p14:creationId xmlns:p14="http://schemas.microsoft.com/office/powerpoint/2010/main" val="3232013466"/>
+        <p14:creationId xmlns:p14="http://schemas.microsoft.com/office/powerpoint/2010/main" val="3482068955"/>
       </p:ext>
     </p:extLst>
   </p:cSld>
@@ -3380,7 +3505,7 @@
   <p:timing>
     <p:tnLst>
       <p:par>
-        <p:cTn xmlns:p14="http://schemas.microsoft.com/office/powerpoint/2010/main" id="1" dur="indefinite" restart="never" nodeType="tmRoot"/>
+        <p:cTn id="1" dur="indefinite" restart="never" nodeType="tmRoot"/>
       </p:par>
     </p:tnLst>
   </p:timing>
@@ -3425,8 +3550,20 @@
           <a:lstStyle/>
           <a:p>
             <a:r>
-              <a:rPr lang="en-US" dirty="0"/>
-              <a:t>IBM LAPI and DCMF</a:t>
+              <a:rPr lang="en-US" dirty="0" err="1"/>
+              <a:t>Myricom</a:t>
+            </a:r>
+            <a:r>
+              <a:rPr lang="en-US" dirty="0"/>
+              <a:t> MX and </a:t>
+            </a:r>
+            <a:r>
+              <a:rPr lang="en-US" dirty="0" err="1"/>
+              <a:t>Qlogic</a:t>
+            </a:r>
+            <a:r>
+              <a:rPr lang="en-US" dirty="0"/>
+              <a:t> PSM</a:t>
             </a:r>
           </a:p>
         </p:txBody>
@@ -3444,7 +3581,7 @@
         <p:spPr>
           <a:xfrm>
             <a:off x="111204" y="1344823"/>
-            <a:ext cx="8229600" cy="3323986"/>
+            <a:ext cx="8229600" cy="4449423"/>
           </a:xfrm>
         </p:spPr>
         <p:txBody>
@@ -3453,45 +3590,52 @@
           <a:p>
             <a:r>
               <a:rPr lang="en-US" dirty="0"/>
-              <a:t>Designed for RS-series and </a:t>
-            </a:r>
-            <a:r>
-              <a:rPr lang="en-US" dirty="0" err="1"/>
-              <a:t>BlueGene</a:t>
-            </a:r>
-            <a:r>
-              <a:rPr lang="en-US" dirty="0"/>
-              <a:t> P/Q</a:t>
-            </a:r>
-          </a:p>
-          <a:p>
-            <a:r>
-              <a:rPr lang="en-US" dirty="0"/>
-              <a:t>Some support outside of IBM exists</a:t>
-            </a:r>
-          </a:p>
-          <a:p>
-            <a:r>
-              <a:rPr lang="en-US" dirty="0"/>
-              <a:t>One-sided and two-sided</a:t>
-            </a:r>
-          </a:p>
-          <a:p>
-            <a:r>
-              <a:rPr lang="en-US" dirty="0"/>
-              <a:t>Contiguous and non-contiguous memory layout</a:t>
-            </a:r>
-          </a:p>
-          <a:p>
-            <a:r>
-              <a:rPr lang="en-US" dirty="0"/>
-              <a:t>Transparent link aggregation</a:t>
-            </a:r>
-          </a:p>
-          <a:p>
-            <a:r>
-              <a:rPr lang="en-US" dirty="0"/>
-              <a:t>DCMF supports ARMCI, GA, MPI, collectives</a:t>
+              <a:t>Similar two-sided, matching API</a:t>
+            </a:r>
+          </a:p>
+          <a:p>
+            <a:pPr lvl="1"/>
+            <a:r>
+              <a:rPr lang="en-US" dirty="0"/>
+              <a:t>Designed to support MPI</a:t>
+            </a:r>
+          </a:p>
+          <a:p>
+            <a:r>
+              <a:rPr lang="en-US" dirty="0"/>
+              <a:t>Eager for small messages</a:t>
+            </a:r>
+          </a:p>
+          <a:p>
+            <a:r>
+              <a:rPr lang="en-US" dirty="0"/>
+              <a:t>Zero-copy, rendezvous for large messages</a:t>
+            </a:r>
+          </a:p>
+          <a:p>
+            <a:r>
+              <a:rPr lang="en-US" dirty="0"/>
+              <a:t>Semi-connectionless</a:t>
+            </a:r>
+          </a:p>
+          <a:p>
+            <a:pPr lvl="1"/>
+            <a:r>
+              <a:rPr lang="en-US" dirty="0"/>
+              <a:t>Target does accept connection requests</a:t>
+            </a:r>
+          </a:p>
+          <a:p>
+            <a:pPr lvl="1"/>
+            <a:r>
+              <a:rPr lang="en-US" dirty="0"/>
+              <a:t>Sender connects before sending</a:t>
+            </a:r>
+          </a:p>
+          <a:p>
+            <a:r>
+              <a:rPr lang="en-US" dirty="0"/>
+              <a:t>Reliable, in-order matching with out-of-order completion (like MPI)</a:t>
             </a:r>
           </a:p>
         </p:txBody>
@@ -3499,7 +3643,7 @@
     </p:spTree>
     <p:extLst>
       <p:ext uri="{BB962C8B-B14F-4D97-AF65-F5344CB8AC3E}">
-        <p14:creationId xmlns:p14="http://schemas.microsoft.com/office/powerpoint/2010/main" val="3993304970"/>
+        <p14:creationId xmlns:p14="http://schemas.microsoft.com/office/powerpoint/2010/main" val="3232013466"/>
       </p:ext>
     </p:extLst>
   </p:cSld>
@@ -3509,7 +3653,7 @@
   <p:timing>
     <p:tnLst>
       <p:par>
-        <p:cTn xmlns:p14="http://schemas.microsoft.com/office/powerpoint/2010/main" id="1" dur="indefinite" restart="never" nodeType="tmRoot"/>
+        <p:cTn id="1" dur="indefinite" restart="never" nodeType="tmRoot"/>
       </p:par>
     </p:tnLst>
   </p:timing>
@@ -3555,7 +3699,7 @@
           <a:p>
             <a:r>
               <a:rPr lang="en-US" dirty="0"/>
-              <a:t>CCI Overview</a:t>
+              <a:t>IBM LAPI and DCMF</a:t>
             </a:r>
           </a:p>
         </p:txBody>
@@ -3573,7 +3717,7 @@
         <p:spPr>
           <a:xfrm>
             <a:off x="111204" y="1344823"/>
-            <a:ext cx="8229600" cy="3059299"/>
+            <a:ext cx="8229600" cy="3323986"/>
           </a:xfrm>
         </p:spPr>
         <p:txBody>
@@ -3582,44 +3726,53 @@
           <a:p>
             <a:r>
               <a:rPr lang="en-US" dirty="0"/>
-              <a:t>Endpoints</a:t>
-            </a:r>
-          </a:p>
-          <a:p>
-            <a:r>
-              <a:rPr lang="en-US" dirty="0"/>
-              <a:t>Connections</a:t>
-            </a:r>
-          </a:p>
-          <a:p>
-            <a:r>
-              <a:rPr lang="en-US" dirty="0"/>
-              <a:t>Communication</a:t>
-            </a:r>
-          </a:p>
-          <a:p>
-            <a:pPr lvl="1"/>
-            <a:r>
-              <a:rPr lang="en-US" dirty="0"/>
-              <a:t>Active Messages</a:t>
-            </a:r>
-          </a:p>
-          <a:p>
-            <a:pPr lvl="1"/>
-            <a:r>
-              <a:rPr lang="en-US" dirty="0"/>
-              <a:t>Remote Memory Access</a:t>
-            </a:r>
-          </a:p>
-          <a:p>
-            <a:endParaRPr lang="en-US" dirty="0"/>
+              <a:t>Designed for RS-series and </a:t>
+            </a:r>
+            <a:r>
+              <a:rPr lang="en-US" dirty="0" err="1"/>
+              <a:t>BlueGene</a:t>
+            </a:r>
+            <a:r>
+              <a:rPr lang="en-US" dirty="0"/>
+              <a:t> P/Q</a:t>
+            </a:r>
+          </a:p>
+          <a:p>
+            <a:r>
+              <a:rPr lang="en-US" dirty="0"/>
+              <a:t>Some support outside of IBM exists</a:t>
+            </a:r>
+          </a:p>
+          <a:p>
+            <a:r>
+              <a:rPr lang="en-US" dirty="0"/>
+              <a:t>One-sided and two-sided</a:t>
+            </a:r>
+          </a:p>
+          <a:p>
+            <a:r>
+              <a:rPr lang="en-US" dirty="0"/>
+              <a:t>Contiguous and non-contiguous memory layout</a:t>
+            </a:r>
+          </a:p>
+          <a:p>
+            <a:r>
+              <a:rPr lang="en-US" dirty="0"/>
+              <a:t>Transparent link aggregation</a:t>
+            </a:r>
+          </a:p>
+          <a:p>
+            <a:r>
+              <a:rPr lang="en-US" dirty="0"/>
+              <a:t>DCMF supports ARMCI, GA, MPI, collectives</a:t>
+            </a:r>
           </a:p>
         </p:txBody>
       </p:sp>
     </p:spTree>
     <p:extLst>
       <p:ext uri="{BB962C8B-B14F-4D97-AF65-F5344CB8AC3E}">
-        <p14:creationId xmlns:p14="http://schemas.microsoft.com/office/powerpoint/2010/main" val="1323073655"/>
+        <p14:creationId xmlns:p14="http://schemas.microsoft.com/office/powerpoint/2010/main" val="3993304970"/>
       </p:ext>
     </p:extLst>
   </p:cSld>
@@ -3629,7 +3782,7 @@
   <p:timing>
     <p:tnLst>
       <p:par>
-        <p:cTn xmlns:p14="http://schemas.microsoft.com/office/powerpoint/2010/main" id="1" dur="indefinite" restart="never" nodeType="tmRoot"/>
+        <p:cTn id="1" dur="indefinite" restart="never" nodeType="tmRoot"/>
       </p:par>
     </p:tnLst>
   </p:timing>
@@ -3675,7 +3828,7 @@
           <a:p>
             <a:r>
               <a:rPr lang="en-US" dirty="0"/>
-              <a:t>CCI Endpoints</a:t>
+              <a:t>CCI Overview</a:t>
             </a:r>
           </a:p>
         </p:txBody>
@@ -3692,8 +3845,8 @@
         </p:nvSpPr>
         <p:spPr>
           <a:xfrm>
-            <a:off x="111204" y="914401"/>
-            <a:ext cx="8229600" cy="5148075"/>
+            <a:off x="111204" y="1344823"/>
+            <a:ext cx="8229600" cy="3059299"/>
           </a:xfrm>
         </p:spPr>
         <p:txBody>
@@ -3702,73 +3855,44 @@
           <a:p>
             <a:r>
               <a:rPr lang="en-US" dirty="0"/>
-              <a:t>Virtualized instance of a device – src/sink of communication</a:t>
-            </a:r>
-          </a:p>
-          <a:p>
-            <a:r>
-              <a:rPr lang="en-US" dirty="0"/>
-              <a:t>Complete container of resources – queues and buffers</a:t>
-            </a:r>
-          </a:p>
-          <a:p>
-            <a:r>
-              <a:rPr lang="en-US" dirty="0"/>
-              <a:t>Process may poll or block for event notification</a:t>
-            </a:r>
-          </a:p>
-          <a:p>
-            <a:r>
-              <a:rPr lang="en-US" dirty="0"/>
-              <a:t>Events for send, </a:t>
-            </a:r>
-            <a:r>
-              <a:rPr lang="en-US" dirty="0" err="1"/>
-              <a:t>recv</a:t>
-            </a:r>
-            <a:r>
-              <a:rPr lang="en-US" dirty="0"/>
-              <a:t>, connection establishment, etc.</a:t>
-            </a:r>
-          </a:p>
-          <a:p>
-            <a:r>
-              <a:rPr lang="en-US" dirty="0"/>
-              <a:t>Events may contain resources such as receive buffers</a:t>
-            </a:r>
-          </a:p>
-          <a:p>
-            <a:r>
-              <a:rPr lang="en-US" dirty="0"/>
-              <a:t>Resource ownership transfers to the process when the event is retrieved</a:t>
-            </a:r>
-          </a:p>
-          <a:p>
-            <a:r>
-              <a:rPr lang="en-US" dirty="0"/>
-              <a:t>The process eventaully returns the event to CCI </a:t>
-            </a:r>
-          </a:p>
-          <a:p>
-            <a:pPr lvl="1"/>
-            <a:r>
-              <a:rPr lang="en-US" dirty="0"/>
-              <a:t>Expected to be returned in a timely manner</a:t>
-            </a:r>
-          </a:p>
-          <a:p>
-            <a:pPr lvl="1"/>
-            <a:r>
-              <a:rPr lang="en-US" dirty="0"/>
-              <a:t>May be returned out of order</a:t>
-            </a:r>
+              <a:t>Endpoints</a:t>
+            </a:r>
+          </a:p>
+          <a:p>
+            <a:r>
+              <a:rPr lang="en-US" dirty="0"/>
+              <a:t>Connections</a:t>
+            </a:r>
+          </a:p>
+          <a:p>
+            <a:r>
+              <a:rPr lang="en-US" dirty="0"/>
+              <a:t>Communication</a:t>
+            </a:r>
+          </a:p>
+          <a:p>
+            <a:pPr lvl="1"/>
+            <a:r>
+              <a:rPr lang="en-US" dirty="0"/>
+              <a:t>Active Messages</a:t>
+            </a:r>
+          </a:p>
+          <a:p>
+            <a:pPr lvl="1"/>
+            <a:r>
+              <a:rPr lang="en-US" dirty="0"/>
+              <a:t>Remote Memory Access</a:t>
+            </a:r>
+          </a:p>
+          <a:p>
+            <a:endParaRPr lang="en-US" dirty="0"/>
           </a:p>
         </p:txBody>
       </p:sp>
     </p:spTree>
     <p:extLst>
       <p:ext uri="{BB962C8B-B14F-4D97-AF65-F5344CB8AC3E}">
-        <p14:creationId xmlns:p14="http://schemas.microsoft.com/office/powerpoint/2010/main" val="3708743750"/>
+        <p14:creationId xmlns:p14="http://schemas.microsoft.com/office/powerpoint/2010/main" val="1323073655"/>
       </p:ext>
     </p:extLst>
   </p:cSld>
@@ -3778,7 +3902,7 @@
   <p:timing>
     <p:tnLst>
       <p:par>
-        <p:cTn xmlns:p14="http://schemas.microsoft.com/office/powerpoint/2010/main" id="1" dur="indefinite" restart="never" nodeType="tmRoot"/>
+        <p:cTn id="1" dur="indefinite" restart="never" nodeType="tmRoot"/>
       </p:par>
     </p:tnLst>
   </p:timing>
@@ -3824,7 +3948,7 @@
           <a:p>
             <a:r>
               <a:rPr lang="en-US" dirty="0"/>
-              <a:t>CCI Connections</a:t>
+              <a:t>CCI Endpoints</a:t>
             </a:r>
           </a:p>
         </p:txBody>
@@ -3841,8 +3965,8 @@
         </p:nvSpPr>
         <p:spPr>
           <a:xfrm>
-            <a:off x="111204" y="1344823"/>
-            <a:ext cx="8229600" cy="4930580"/>
+            <a:off x="111204" y="914401"/>
+            <a:ext cx="8229600" cy="5148075"/>
           </a:xfrm>
         </p:spPr>
         <p:txBody>
@@ -3851,66 +3975,65 @@
           <a:p>
             <a:r>
               <a:rPr lang="en-US" dirty="0"/>
-              <a:t>Per peer - a single endpoint can handle many connections</a:t>
-            </a:r>
-          </a:p>
-          <a:p>
-            <a:r>
-              <a:rPr lang="en-US" dirty="0"/>
-              <a:t>Lightweight – no dedicated buffers (~120B/peer)</a:t>
-            </a:r>
-          </a:p>
-          <a:p>
-            <a:r>
-              <a:rPr lang="en-US" dirty="0"/>
-              <a:t>May have multiple connections to the same peer</a:t>
-            </a:r>
-          </a:p>
-          <a:p>
-            <a:r>
-              <a:rPr lang="en-US" dirty="0"/>
-              <a:t>Use client/server model similar to Sockets and RDMA-CM</a:t>
-            </a:r>
-          </a:p>
-          <a:p>
-            <a:r>
-              <a:rPr lang="en-US" dirty="0"/>
-              <a:t>Represents reliability and order attributes</a:t>
-            </a:r>
-          </a:p>
-          <a:p>
-            <a:pPr lvl="1"/>
-            <a:r>
-              <a:rPr lang="en-US" dirty="0"/>
-              <a:t>Reliable with Ordered completion (RO)</a:t>
-            </a:r>
-          </a:p>
-          <a:p>
-            <a:pPr lvl="1"/>
-            <a:r>
-              <a:rPr lang="en-US" dirty="0"/>
-              <a:t>Reliable with Unordered completion (RU)</a:t>
-            </a:r>
-          </a:p>
-          <a:p>
-            <a:pPr lvl="1"/>
-            <a:r>
-              <a:rPr lang="en-US" dirty="0"/>
-              <a:t>Unreliable with Unordered completion (UU)</a:t>
-            </a:r>
-          </a:p>
-          <a:p>
-            <a:pPr lvl="1"/>
-            <a:r>
-              <a:rPr lang="en-US" dirty="0"/>
-              <a:t>Multicast Send (MC_TX)</a:t>
-            </a:r>
-          </a:p>
-          <a:p>
-            <a:pPr lvl="1"/>
-            <a:r>
-              <a:rPr lang="en-US" dirty="0"/>
-              <a:t>Multicast Receive (MC_RX)</a:t>
+              <a:t>Virtualized instance of a device – src/sink of communication</a:t>
+            </a:r>
+          </a:p>
+          <a:p>
+            <a:r>
+              <a:rPr lang="en-US" dirty="0"/>
+              <a:t>Complete container of resources – queues and buffers</a:t>
+            </a:r>
+          </a:p>
+          <a:p>
+            <a:r>
+              <a:rPr lang="en-US" dirty="0"/>
+              <a:t>Process may poll or block for event notification</a:t>
+            </a:r>
+          </a:p>
+          <a:p>
+            <a:r>
+              <a:rPr lang="en-US" dirty="0"/>
+              <a:t>Events for send, </a:t>
+            </a:r>
+            <a:r>
+              <a:rPr lang="en-US" dirty="0" err="1"/>
+              <a:t>recv</a:t>
+            </a:r>
+            <a:r>
+              <a:rPr lang="en-US" dirty="0"/>
+              <a:t>, connection establishment, etc.</a:t>
+            </a:r>
+          </a:p>
+          <a:p>
+            <a:r>
+              <a:rPr lang="en-US" dirty="0"/>
+              <a:t>Events may contain resources such as receive buffers</a:t>
+            </a:r>
+          </a:p>
+          <a:p>
+            <a:r>
+              <a:rPr lang="en-US" dirty="0"/>
+              <a:t>Resource ownership transfers to the process when the event is retrieved</a:t>
+            </a:r>
+          </a:p>
+          <a:p>
+            <a:r>
+              <a:rPr lang="en-US" dirty="0"/>
+              <a:t>The process eventaully returns the event to CCI </a:t>
+            </a:r>
+          </a:p>
+          <a:p>
+            <a:pPr lvl="1"/>
+            <a:r>
+              <a:rPr lang="en-US" dirty="0"/>
+              <a:t>Expected to be returned in a timely manner</a:t>
+            </a:r>
+          </a:p>
+          <a:p>
+            <a:pPr lvl="1"/>
+            <a:r>
+              <a:rPr lang="en-US" dirty="0"/>
+              <a:t>May be returned out of order</a:t>
             </a:r>
           </a:p>
         </p:txBody>
@@ -3918,7 +4041,7 @@
     </p:spTree>
     <p:extLst>
       <p:ext uri="{BB962C8B-B14F-4D97-AF65-F5344CB8AC3E}">
-        <p14:creationId xmlns:p14="http://schemas.microsoft.com/office/powerpoint/2010/main" val="1638107233"/>
+        <p14:creationId xmlns:p14="http://schemas.microsoft.com/office/powerpoint/2010/main" val="3708743750"/>
       </p:ext>
     </p:extLst>
   </p:cSld>
@@ -3928,7 +4051,7 @@
   <p:timing>
     <p:tnLst>
       <p:par>
-        <p:cTn xmlns:p14="http://schemas.microsoft.com/office/powerpoint/2010/main" id="1" dur="indefinite" restart="never" nodeType="tmRoot"/>
+        <p:cTn id="1" dur="indefinite" restart="never" nodeType="tmRoot"/>
       </p:par>
     </p:tnLst>
   </p:timing>
@@ -4043,7 +4166,7 @@
   <p:timing>
     <p:tnLst>
       <p:par>
-        <p:cTn xmlns:p14="http://schemas.microsoft.com/office/powerpoint/2010/main" id="1" dur="indefinite" restart="never" nodeType="tmRoot"/>
+        <p:cTn id="1" dur="indefinite" restart="never" nodeType="tmRoot"/>
       </p:par>
     </p:tnLst>
   </p:timing>
@@ -4089,7 +4212,7 @@
           <a:p>
             <a:r>
               <a:rPr lang="en-US" dirty="0"/>
-              <a:t>Active Messages</a:t>
+              <a:t>CCI Connections</a:t>
             </a:r>
           </a:p>
         </p:txBody>
@@ -4106,8 +4229,8 @@
         </p:nvSpPr>
         <p:spPr>
           <a:xfrm>
-            <a:off x="111204" y="800100"/>
-            <a:ext cx="8229600" cy="5842021"/>
+            <a:off x="111204" y="1344823"/>
+            <a:ext cx="8229600" cy="4930580"/>
           </a:xfrm>
         </p:spPr>
         <p:txBody>
@@ -4116,90 +4239,66 @@
           <a:p>
             <a:r>
               <a:rPr lang="en-US" dirty="0"/>
-              <a:t>Berkeley AM</a:t>
-            </a:r>
-          </a:p>
-          <a:p>
-            <a:pPr lvl="1"/>
-            <a:r>
-              <a:rPr lang="en-US" dirty="0"/>
-              <a:t>No posted receives</a:t>
-            </a:r>
-          </a:p>
-          <a:p>
-            <a:pPr lvl="1"/>
-            <a:r>
-              <a:rPr lang="en-US" dirty="0"/>
-              <a:t>Handlers run based on address in header</a:t>
-            </a:r>
-          </a:p>
-          <a:p>
-            <a:pPr lvl="2"/>
-            <a:r>
-              <a:rPr lang="en-US" dirty="0"/>
-              <a:t>No adittional progress until handler completes</a:t>
-            </a:r>
-          </a:p>
-          <a:p>
-            <a:pPr lvl="1"/>
-            <a:r>
-              <a:rPr lang="en-US" dirty="0"/>
-              <a:t>Internally managed buffers</a:t>
-            </a:r>
-          </a:p>
-          <a:p>
-            <a:r>
-              <a:rPr lang="en-US" dirty="0"/>
-              <a:t>CCI Active Messages</a:t>
-            </a:r>
-          </a:p>
-          <a:p>
-            <a:pPr lvl="1"/>
-            <a:r>
-              <a:rPr lang="en-US" dirty="0"/>
-              <a:t>No posted receives, uses internal buffers</a:t>
-            </a:r>
-          </a:p>
-          <a:p>
-            <a:pPr lvl="1"/>
-            <a:r>
-              <a:rPr lang="en-US" dirty="0"/>
-              <a:t>Events only, no handlers</a:t>
-            </a:r>
-          </a:p>
-          <a:p>
-            <a:pPr lvl="2"/>
-            <a:r>
-              <a:rPr lang="en-US" dirty="0"/>
-              <a:t>Event includes pointer to data, its length, and the connection (peer)</a:t>
-            </a:r>
-          </a:p>
-          <a:p>
-            <a:pPr lvl="1"/>
-            <a:r>
-              <a:rPr lang="en-US" dirty="0"/>
-              <a:t>May be inspected, modified, and/or sent in-place</a:t>
-            </a:r>
-          </a:p>
-          <a:p>
-            <a:pPr lvl="1"/>
-            <a:r>
-              <a:rPr lang="en-US" dirty="0"/>
-              <a:t>May be copied out if needed long term</a:t>
-            </a:r>
-          </a:p>
-          <a:p>
-            <a:pPr lvl="1"/>
-            <a:r>
-              <a:rPr lang="en-US" dirty="0"/>
-              <a:t>Limited in size – ideally MTU sized</a:t>
-            </a:r>
-          </a:p>
-          <a:p>
-            <a:pPr lvl="1"/>
-            <a:r>
-              <a:rPr lang="en-US" dirty="0"/>
-              <a:t>No segmenting/reassembly</a:t>
+              <a:t>Per peer - a single endpoint can handle many connections</a:t>
+            </a:r>
+          </a:p>
+          <a:p>
+            <a:r>
+              <a:rPr lang="en-US" dirty="0"/>
+              <a:t>Lightweight – no dedicated buffers (~120B/peer)</a:t>
+            </a:r>
+          </a:p>
+          <a:p>
+            <a:r>
+              <a:rPr lang="en-US" dirty="0"/>
+              <a:t>May have multiple connections to the same peer</a:t>
+            </a:r>
+          </a:p>
+          <a:p>
+            <a:r>
+              <a:rPr lang="en-US" dirty="0"/>
+              <a:t>Use client/server model similar to Sockets and RDMA-CM</a:t>
+            </a:r>
+          </a:p>
+          <a:p>
+            <a:r>
+              <a:rPr lang="en-US" dirty="0"/>
+              <a:t>Represents reliability and order attributes</a:t>
+            </a:r>
+          </a:p>
+          <a:p>
+            <a:pPr lvl="1"/>
+            <a:r>
+              <a:rPr lang="en-US" dirty="0"/>
+              <a:t>Reliable with Ordered completion (RO)</a:t>
+            </a:r>
+          </a:p>
+          <a:p>
+            <a:pPr lvl="1"/>
+            <a:r>
+              <a:rPr lang="en-US" dirty="0"/>
+              <a:t>Reliable with Unordered completion (RU)</a:t>
+            </a:r>
+          </a:p>
+          <a:p>
+            <a:pPr lvl="1"/>
+            <a:r>
+              <a:rPr lang="en-US" dirty="0"/>
+              <a:t>Unreliable with Unordered completion (UU)</a:t>
+            </a:r>
+          </a:p>
+          <a:p>
+            <a:pPr lvl="1"/>
+            <a:r>
+              <a:rPr lang="en-US" dirty="0"/>
+              <a:t>Multicast Send (MC_TX)</a:t>
+            </a:r>
+          </a:p>
+          <a:p>
+            <a:pPr lvl="1"/>
+            <a:r>
+              <a:rPr lang="en-US" dirty="0"/>
+              <a:t>Multicast Receive (MC_RX)</a:t>
             </a:r>
           </a:p>
         </p:txBody>
@@ -4207,7 +4306,7 @@
     </p:spTree>
     <p:extLst>
       <p:ext uri="{BB962C8B-B14F-4D97-AF65-F5344CB8AC3E}">
-        <p14:creationId xmlns:p14="http://schemas.microsoft.com/office/powerpoint/2010/main" val="2221889953"/>
+        <p14:creationId xmlns:p14="http://schemas.microsoft.com/office/powerpoint/2010/main" val="1638107233"/>
       </p:ext>
     </p:extLst>
   </p:cSld>
@@ -4217,7 +4316,7 @@
   <p:timing>
     <p:tnLst>
       <p:par>
-        <p:cTn xmlns:p14="http://schemas.microsoft.com/office/powerpoint/2010/main" id="1" dur="indefinite" restart="never" nodeType="tmRoot"/>
+        <p:cTn id="1" dur="indefinite" restart="never" nodeType="tmRoot"/>
       </p:par>
     </p:tnLst>
   </p:timing>
@@ -4263,7 +4362,7 @@
           <a:p>
             <a:r>
               <a:rPr lang="en-US" dirty="0"/>
-              <a:t>CCI RMA</a:t>
+              <a:t>Active Messages</a:t>
             </a:r>
           </a:p>
         </p:txBody>
@@ -4280,8 +4379,8 @@
         </p:nvSpPr>
         <p:spPr>
           <a:xfrm>
-            <a:off x="111204" y="1344823"/>
-            <a:ext cx="8229600" cy="3626634"/>
+            <a:off x="111204" y="800100"/>
+            <a:ext cx="8229600" cy="5842021"/>
           </a:xfrm>
         </p:spPr>
         <p:txBody>
@@ -4290,45 +4389,90 @@
           <a:p>
             <a:r>
               <a:rPr lang="en-US" dirty="0"/>
-              <a:t>Active messages are not enough</a:t>
-            </a:r>
-          </a:p>
-          <a:p>
-            <a:pPr lvl="1"/>
-            <a:r>
-              <a:rPr lang="en-US" dirty="0"/>
-              <a:t>But they are enough to allow setup of RMA</a:t>
-            </a:r>
-          </a:p>
-          <a:p>
-            <a:r>
-              <a:rPr lang="en-US" dirty="0"/>
-              <a:t>Zero-copy when supported</a:t>
-            </a:r>
-          </a:p>
-          <a:p>
-            <a:r>
-              <a:rPr lang="en-US" dirty="0"/>
-              <a:t>Require memory registration</a:t>
-            </a:r>
-          </a:p>
-          <a:p>
-            <a:r>
-              <a:rPr lang="en-US" dirty="0"/>
-              <a:t>No intra-message order guarantee</a:t>
-            </a:r>
-          </a:p>
-          <a:p>
-            <a:pPr lvl="1"/>
-            <a:r>
-              <a:rPr lang="en-US" dirty="0"/>
-              <a:t>No last byte written last</a:t>
-            </a:r>
-          </a:p>
-          <a:p>
-            <a:r>
-              <a:rPr lang="en-US" dirty="0"/>
-              <a:t>Write or Read with an optional Fence</a:t>
+              <a:t>Berkeley AM</a:t>
+            </a:r>
+          </a:p>
+          <a:p>
+            <a:pPr lvl="1"/>
+            <a:r>
+              <a:rPr lang="en-US" dirty="0"/>
+              <a:t>No posted receives</a:t>
+            </a:r>
+          </a:p>
+          <a:p>
+            <a:pPr lvl="1"/>
+            <a:r>
+              <a:rPr lang="en-US" dirty="0"/>
+              <a:t>Handlers run based on address in header</a:t>
+            </a:r>
+          </a:p>
+          <a:p>
+            <a:pPr lvl="2"/>
+            <a:r>
+              <a:rPr lang="en-US" dirty="0"/>
+              <a:t>No adittional progress until handler completes</a:t>
+            </a:r>
+          </a:p>
+          <a:p>
+            <a:pPr lvl="1"/>
+            <a:r>
+              <a:rPr lang="en-US" dirty="0"/>
+              <a:t>Internally managed buffers</a:t>
+            </a:r>
+          </a:p>
+          <a:p>
+            <a:r>
+              <a:rPr lang="en-US" dirty="0"/>
+              <a:t>CCI Active Messages</a:t>
+            </a:r>
+          </a:p>
+          <a:p>
+            <a:pPr lvl="1"/>
+            <a:r>
+              <a:rPr lang="en-US" dirty="0"/>
+              <a:t>No posted receives, uses internal buffers</a:t>
+            </a:r>
+          </a:p>
+          <a:p>
+            <a:pPr lvl="1"/>
+            <a:r>
+              <a:rPr lang="en-US" dirty="0"/>
+              <a:t>Events only, no handlers</a:t>
+            </a:r>
+          </a:p>
+          <a:p>
+            <a:pPr lvl="2"/>
+            <a:r>
+              <a:rPr lang="en-US" dirty="0"/>
+              <a:t>Event includes pointer to data, its length, and the connection (peer)</a:t>
+            </a:r>
+          </a:p>
+          <a:p>
+            <a:pPr lvl="1"/>
+            <a:r>
+              <a:rPr lang="en-US" dirty="0"/>
+              <a:t>May be inspected, modified, and/or sent in-place</a:t>
+            </a:r>
+          </a:p>
+          <a:p>
+            <a:pPr lvl="1"/>
+            <a:r>
+              <a:rPr lang="en-US" dirty="0"/>
+              <a:t>May be copied out if needed long term</a:t>
+            </a:r>
+          </a:p>
+          <a:p>
+            <a:pPr lvl="1"/>
+            <a:r>
+              <a:rPr lang="en-US" dirty="0"/>
+              <a:t>Limited in size – ideally MTU sized</a:t>
+            </a:r>
+          </a:p>
+          <a:p>
+            <a:pPr lvl="1"/>
+            <a:r>
+              <a:rPr lang="en-US" dirty="0"/>
+              <a:t>No segmenting/reassembly</a:t>
             </a:r>
           </a:p>
         </p:txBody>
@@ -4336,7 +4480,7 @@
     </p:spTree>
     <p:extLst>
       <p:ext uri="{BB962C8B-B14F-4D97-AF65-F5344CB8AC3E}">
-        <p14:creationId xmlns:p14="http://schemas.microsoft.com/office/powerpoint/2010/main" val="3382555788"/>
+        <p14:creationId xmlns:p14="http://schemas.microsoft.com/office/powerpoint/2010/main" val="2221889953"/>
       </p:ext>
     </p:extLst>
   </p:cSld>
@@ -4346,7 +4490,7 @@
   <p:timing>
     <p:tnLst>
       <p:par>
-        <p:cTn xmlns:p14="http://schemas.microsoft.com/office/powerpoint/2010/main" id="1" dur="indefinite" restart="never" nodeType="tmRoot"/>
+        <p:cTn id="1" dur="indefinite" restart="never" nodeType="tmRoot"/>
       </p:par>
     </p:tnLst>
   </p:timing>
@@ -4392,7 +4536,7 @@
           <a:p>
             <a:r>
               <a:rPr lang="en-US" dirty="0"/>
-              <a:t>Status and Evaluation</a:t>
+              <a:t>CCI RMA</a:t>
             </a:r>
           </a:p>
         </p:txBody>
@@ -4410,7 +4554,7 @@
         <p:spPr>
           <a:xfrm>
             <a:off x="111204" y="1344823"/>
-            <a:ext cx="8229600" cy="5366597"/>
+            <a:ext cx="8229600" cy="3626634"/>
           </a:xfrm>
         </p:spPr>
         <p:txBody>
@@ -4418,80 +4562,54 @@
           <a:lstStyle/>
           <a:p>
             <a:r>
-              <a:rPr lang="en-US" strike="sngStrike" dirty="0"/>
-              <a:t>Three</a:t>
-            </a:r>
-            <a:r>
-              <a:rPr lang="en-US" dirty="0"/>
-              <a:t> Four proof-of-concept implementations</a:t>
-            </a:r>
-          </a:p>
-          <a:p>
-            <a:pPr lvl="1"/>
-            <a:r>
-              <a:rPr lang="en-US" dirty="0"/>
-              <a:t>Sockets, MX, Portals 3.3, Native SeaStar</a:t>
-            </a:r>
-          </a:p>
-          <a:p>
-            <a:r>
-              <a:rPr lang="en-US" dirty="0"/>
-              <a:t>Sockets</a:t>
-            </a:r>
-          </a:p>
-          <a:p>
-            <a:pPr lvl="1"/>
-            <a:r>
-              <a:rPr lang="en-US" dirty="0"/>
-              <a:t>Uses UDP with one socket per endpoint</a:t>
-            </a:r>
-          </a:p>
-          <a:p>
-            <a:pPr lvl="1"/>
-            <a:r>
-              <a:rPr lang="en-US" dirty="0"/>
-              <a:t>Implements reliability when required</a:t>
-            </a:r>
-          </a:p>
-          <a:p>
-            <a:pPr lvl="1"/>
-            <a:r>
-              <a:rPr lang="en-US" dirty="0"/>
-              <a:t>Implements AM, RMA Write</a:t>
-            </a:r>
-          </a:p>
-          <a:p>
-            <a:r>
-              <a:rPr lang="en-US" dirty="0"/>
-              <a:t>MX</a:t>
-            </a:r>
-          </a:p>
-          <a:p>
-            <a:pPr lvl="1"/>
-            <a:r>
-              <a:rPr lang="en-US" dirty="0"/>
-              <a:t>Implements AM only</a:t>
-            </a:r>
-          </a:p>
-          <a:p>
-            <a:pPr lvl="1"/>
-            <a:r>
-              <a:rPr lang="en-US" dirty="0"/>
-              <a:t>CCI requests rendezvous when reliability is requested</a:t>
-            </a:r>
-          </a:p>
-          <a:p>
-            <a:endParaRPr lang="en-US" dirty="0"/>
-          </a:p>
-          <a:p>
-            <a:endParaRPr lang="en-US" dirty="0"/>
+              <a:rPr lang="en-US" dirty="0"/>
+              <a:t>Active messages are not enough</a:t>
+            </a:r>
+          </a:p>
+          <a:p>
+            <a:pPr lvl="1"/>
+            <a:r>
+              <a:rPr lang="en-US" dirty="0"/>
+              <a:t>But they are enough to allow setup of RMA</a:t>
+            </a:r>
+          </a:p>
+          <a:p>
+            <a:r>
+              <a:rPr lang="en-US" dirty="0"/>
+              <a:t>Zero-copy when supported</a:t>
+            </a:r>
+          </a:p>
+          <a:p>
+            <a:r>
+              <a:rPr lang="en-US" dirty="0"/>
+              <a:t>Require memory registration</a:t>
+            </a:r>
+          </a:p>
+          <a:p>
+            <a:r>
+              <a:rPr lang="en-US" dirty="0"/>
+              <a:t>No intra-message order guarantee</a:t>
+            </a:r>
+          </a:p>
+          <a:p>
+            <a:pPr lvl="1"/>
+            <a:r>
+              <a:rPr lang="en-US" dirty="0"/>
+              <a:t>No last byte written last</a:t>
+            </a:r>
+          </a:p>
+          <a:p>
+            <a:r>
+              <a:rPr lang="en-US" dirty="0"/>
+              <a:t>Write or Read with an optional Fence</a:t>
+            </a:r>
           </a:p>
         </p:txBody>
       </p:sp>
     </p:spTree>
     <p:extLst>
       <p:ext uri="{BB962C8B-B14F-4D97-AF65-F5344CB8AC3E}">
-        <p14:creationId xmlns:p14="http://schemas.microsoft.com/office/powerpoint/2010/main" val="2889010775"/>
+        <p14:creationId xmlns:p14="http://schemas.microsoft.com/office/powerpoint/2010/main" val="3382555788"/>
       </p:ext>
     </p:extLst>
   </p:cSld>
@@ -4501,7 +4619,7 @@
   <p:timing>
     <p:tnLst>
       <p:par>
-        <p:cTn xmlns:p14="http://schemas.microsoft.com/office/powerpoint/2010/main" id="1" dur="indefinite" restart="never" nodeType="tmRoot"/>
+        <p:cTn id="1" dur="indefinite" restart="never" nodeType="tmRoot"/>
       </p:par>
     </p:tnLst>
   </p:timing>
@@ -4565,7 +4683,7 @@
         <p:spPr>
           <a:xfrm>
             <a:off x="111204" y="1344823"/>
-            <a:ext cx="8229600" cy="4043158"/>
+            <a:ext cx="8229600" cy="5366597"/>
           </a:xfrm>
         </p:spPr>
         <p:txBody>
@@ -4573,50 +4691,52 @@
           <a:lstStyle/>
           <a:p>
             <a:r>
-              <a:rPr lang="en-US" dirty="0"/>
-              <a:t>Portals 3.3</a:t>
-            </a:r>
-          </a:p>
-          <a:p>
-            <a:pPr lvl="1"/>
-            <a:r>
-              <a:rPr lang="en-US" dirty="0"/>
-              <a:t>Implements multiple endpoints using match bits</a:t>
-            </a:r>
-          </a:p>
-          <a:p>
-            <a:pPr lvl="1"/>
-            <a:r>
-              <a:rPr lang="en-US" dirty="0"/>
-              <a:t>Portals assumes reliability</a:t>
-            </a:r>
-          </a:p>
-          <a:p>
-            <a:pPr lvl="2"/>
-            <a:r>
-              <a:rPr lang="en-US" dirty="0"/>
-              <a:t>CCI requests </a:t>
-            </a:r>
-            <a:r>
-              <a:rPr lang="en-US" dirty="0" err="1"/>
-              <a:t>acks</a:t>
-            </a:r>
-            <a:r>
-              <a:rPr lang="en-US" dirty="0"/>
-              <a:t> for reliable connections</a:t>
-            </a:r>
-          </a:p>
-          <a:p>
-            <a:pPr lvl="1"/>
-            <a:r>
-              <a:rPr lang="en-US" dirty="0"/>
-              <a:t>Implements AM, RMA Write, Read, and Fence</a:t>
-            </a:r>
-          </a:p>
-          <a:p>
-            <a:r>
-              <a:rPr lang="en-US" dirty="0"/>
-              <a:t>Native SeaStar</a:t>
+              <a:rPr lang="en-US" strike="sngStrike" dirty="0"/>
+              <a:t>Three</a:t>
+            </a:r>
+            <a:r>
+              <a:rPr lang="en-US" dirty="0"/>
+              <a:t> Four proof-of-concept implementations</a:t>
+            </a:r>
+          </a:p>
+          <a:p>
+            <a:pPr lvl="1"/>
+            <a:r>
+              <a:rPr lang="en-US" dirty="0"/>
+              <a:t>Sockets, MX, Portals 3.3, Native SeaStar</a:t>
+            </a:r>
+          </a:p>
+          <a:p>
+            <a:r>
+              <a:rPr lang="en-US" dirty="0"/>
+              <a:t>Sockets</a:t>
+            </a:r>
+          </a:p>
+          <a:p>
+            <a:pPr lvl="1"/>
+            <a:r>
+              <a:rPr lang="en-US" dirty="0"/>
+              <a:t>Uses UDP with one socket per endpoint</a:t>
+            </a:r>
+          </a:p>
+          <a:p>
+            <a:pPr lvl="1"/>
+            <a:r>
+              <a:rPr lang="en-US" dirty="0"/>
+              <a:t>Implements reliability when required</a:t>
+            </a:r>
+          </a:p>
+          <a:p>
+            <a:pPr lvl="1"/>
+            <a:r>
+              <a:rPr lang="en-US" dirty="0"/>
+              <a:t>Implements AM, RMA Write</a:t>
+            </a:r>
+          </a:p>
+          <a:p>
+            <a:r>
+              <a:rPr lang="en-US" dirty="0"/>
+              <a:t>MX</a:t>
             </a:r>
           </a:p>
           <a:p>
@@ -4630,22 +4750,21 @@
             <a:pPr lvl="1"/>
             <a:r>
               <a:rPr lang="en-US" dirty="0"/>
-              <a:t>Unreliable only (working on reliability layer)</a:t>
-            </a:r>
-          </a:p>
-          <a:p>
-            <a:pPr lvl="1"/>
-            <a:r>
-              <a:rPr lang="en-US" dirty="0"/>
-              <a:t>Working on adding RMA </a:t>
-            </a:r>
+              <a:t>CCI requests rendezvous when reliability is requested</a:t>
+            </a:r>
+          </a:p>
+          <a:p>
+            <a:endParaRPr lang="en-US" dirty="0"/>
+          </a:p>
+          <a:p>
+            <a:endParaRPr lang="en-US" dirty="0"/>
           </a:p>
         </p:txBody>
       </p:sp>
     </p:spTree>
     <p:extLst>
       <p:ext uri="{BB962C8B-B14F-4D97-AF65-F5344CB8AC3E}">
-        <p14:creationId xmlns:p14="http://schemas.microsoft.com/office/powerpoint/2010/main" val="4192586054"/>
+        <p14:creationId xmlns:p14="http://schemas.microsoft.com/office/powerpoint/2010/main" val="2889010775"/>
       </p:ext>
     </p:extLst>
   </p:cSld>
@@ -4655,7 +4774,7 @@
   <p:timing>
     <p:tnLst>
       <p:par>
-        <p:cTn xmlns:p14="http://schemas.microsoft.com/office/powerpoint/2010/main" id="1" dur="indefinite" restart="never" nodeType="tmRoot"/>
+        <p:cTn id="1" dur="indefinite" restart="never" nodeType="tmRoot"/>
       </p:par>
     </p:tnLst>
   </p:timing>
@@ -4701,75 +4820,105 @@
           <a:p>
             <a:r>
               <a:rPr lang="en-US" dirty="0"/>
-              <a:t>CCI/MX Performance</a:t>
-            </a:r>
-          </a:p>
-        </p:txBody>
-      </p:sp>
-      <p:pic>
-        <p:nvPicPr>
-          <p:cNvPr id="3" name="Picture 2" descr="pingpong-latency-mx-overhead-combined.pdf"/>
-          <p:cNvPicPr>
-            <a:picLocks noChangeAspect="1"/>
-          </p:cNvPicPr>
-          <p:nvPr/>
-        </p:nvPicPr>
-        <p:blipFill>
-          <a:blip r:embed="rId2">
-            <a:extLst>
-              <a:ext uri="{28A0092B-C50C-407E-A947-70E740481C1C}">
-                <a14:useLocalDpi xmlns:a14="http://schemas.microsoft.com/office/drawing/2010/main" val="0"/>
-              </a:ext>
-            </a:extLst>
-          </a:blip>
-          <a:stretch>
-            <a:fillRect/>
-          </a:stretch>
-        </p:blipFill>
-        <p:spPr>
-          <a:xfrm>
-            <a:off x="0" y="1828800"/>
-            <a:ext cx="4572000" cy="3200400"/>
-          </a:xfrm>
-          <a:prstGeom prst="rect">
-            <a:avLst/>
-          </a:prstGeom>
-        </p:spPr>
-      </p:pic>
-      <p:pic>
-        <p:nvPicPr>
-          <p:cNvPr id="4" name="Picture 3" descr="pingpong-bw-mx.pdf"/>
-          <p:cNvPicPr>
-            <a:picLocks noChangeAspect="1"/>
-          </p:cNvPicPr>
-          <p:nvPr/>
-        </p:nvPicPr>
-        <p:blipFill>
-          <a:blip r:embed="rId3">
-            <a:extLst>
-              <a:ext uri="{28A0092B-C50C-407E-A947-70E740481C1C}">
-                <a14:useLocalDpi xmlns:a14="http://schemas.microsoft.com/office/drawing/2010/main" val="0"/>
-              </a:ext>
-            </a:extLst>
-          </a:blip>
-          <a:stretch>
-            <a:fillRect/>
-          </a:stretch>
-        </p:blipFill>
-        <p:spPr>
-          <a:xfrm>
-            <a:off x="4572000" y="1792256"/>
-            <a:ext cx="4572000" cy="3200400"/>
-          </a:xfrm>
-          <a:prstGeom prst="rect">
-            <a:avLst/>
-          </a:prstGeom>
-        </p:spPr>
-      </p:pic>
+              <a:t>Status and Evaluation</a:t>
+            </a:r>
+          </a:p>
+        </p:txBody>
+      </p:sp>
+      <p:sp>
+        <p:nvSpPr>
+          <p:cNvPr id="3" name="Content Placeholder 2"/>
+          <p:cNvSpPr>
+            <a:spLocks noGrp="1"/>
+          </p:cNvSpPr>
+          <p:nvPr>
+            <p:ph idx="1"/>
+          </p:nvPr>
+        </p:nvSpPr>
+        <p:spPr>
+          <a:xfrm>
+            <a:off x="111204" y="1344823"/>
+            <a:ext cx="8229600" cy="4043158"/>
+          </a:xfrm>
+        </p:spPr>
+        <p:txBody>
+          <a:bodyPr/>
+          <a:lstStyle/>
+          <a:p>
+            <a:r>
+              <a:rPr lang="en-US" dirty="0"/>
+              <a:t>Portals 3.3</a:t>
+            </a:r>
+          </a:p>
+          <a:p>
+            <a:pPr lvl="1"/>
+            <a:r>
+              <a:rPr lang="en-US" dirty="0"/>
+              <a:t>Implements multiple endpoints using match bits</a:t>
+            </a:r>
+          </a:p>
+          <a:p>
+            <a:pPr lvl="1"/>
+            <a:r>
+              <a:rPr lang="en-US" dirty="0"/>
+              <a:t>Portals assumes reliability</a:t>
+            </a:r>
+          </a:p>
+          <a:p>
+            <a:pPr lvl="2"/>
+            <a:r>
+              <a:rPr lang="en-US" dirty="0"/>
+              <a:t>CCI requests </a:t>
+            </a:r>
+            <a:r>
+              <a:rPr lang="en-US" dirty="0" err="1"/>
+              <a:t>acks</a:t>
+            </a:r>
+            <a:r>
+              <a:rPr lang="en-US" dirty="0"/>
+              <a:t> for reliable connections</a:t>
+            </a:r>
+          </a:p>
+          <a:p>
+            <a:pPr lvl="1"/>
+            <a:r>
+              <a:rPr lang="en-US" dirty="0"/>
+              <a:t>Implements AM, RMA Write, Read, and Fence</a:t>
+            </a:r>
+          </a:p>
+          <a:p>
+            <a:r>
+              <a:rPr lang="en-US" dirty="0"/>
+              <a:t>Native SeaStar</a:t>
+            </a:r>
+          </a:p>
+          <a:p>
+            <a:pPr lvl="1"/>
+            <a:r>
+              <a:rPr lang="en-US" dirty="0"/>
+              <a:t>Implements AM only</a:t>
+            </a:r>
+          </a:p>
+          <a:p>
+            <a:pPr lvl="1"/>
+            <a:r>
+              <a:rPr lang="en-US" dirty="0"/>
+              <a:t>Unreliable only (working on reliability layer)</a:t>
+            </a:r>
+          </a:p>
+          <a:p>
+            <a:pPr lvl="1"/>
+            <a:r>
+              <a:rPr lang="en-US" dirty="0"/>
+              <a:t>Working on adding RMA </a:t>
+            </a:r>
+          </a:p>
+        </p:txBody>
+      </p:sp>
     </p:spTree>
     <p:extLst>
       <p:ext uri="{BB962C8B-B14F-4D97-AF65-F5344CB8AC3E}">
-        <p14:creationId xmlns:p14="http://schemas.microsoft.com/office/powerpoint/2010/main" val="2767896140"/>
+        <p14:creationId xmlns:p14="http://schemas.microsoft.com/office/powerpoint/2010/main" val="4192586054"/>
       </p:ext>
     </p:extLst>
   </p:cSld>
@@ -4779,7 +4928,7 @@
   <p:timing>
     <p:tnLst>
       <p:par>
-        <p:cTn xmlns:p14="http://schemas.microsoft.com/office/powerpoint/2010/main" id="1" dur="indefinite" restart="never" nodeType="tmRoot"/>
+        <p:cTn id="1" dur="indefinite" restart="never" nodeType="tmRoot"/>
       </p:par>
     </p:tnLst>
   </p:timing>
@@ -4825,6 +4974,130 @@
           <a:p>
             <a:r>
               <a:rPr lang="en-US" dirty="0"/>
+              <a:t>CCI/MX Performance</a:t>
+            </a:r>
+          </a:p>
+        </p:txBody>
+      </p:sp>
+      <p:pic>
+        <p:nvPicPr>
+          <p:cNvPr id="3" name="Picture 2" descr="pingpong-latency-mx-overhead-combined.pdf"/>
+          <p:cNvPicPr>
+            <a:picLocks noChangeAspect="1"/>
+          </p:cNvPicPr>
+          <p:nvPr/>
+        </p:nvPicPr>
+        <p:blipFill>
+          <a:blip r:embed="rId2">
+            <a:extLst>
+              <a:ext uri="{28A0092B-C50C-407E-A947-70E740481C1C}">
+                <a14:useLocalDpi xmlns:a14="http://schemas.microsoft.com/office/drawing/2010/main" val="0"/>
+              </a:ext>
+            </a:extLst>
+          </a:blip>
+          <a:stretch>
+            <a:fillRect/>
+          </a:stretch>
+        </p:blipFill>
+        <p:spPr>
+          <a:xfrm>
+            <a:off x="0" y="1828800"/>
+            <a:ext cx="4572000" cy="3200400"/>
+          </a:xfrm>
+          <a:prstGeom prst="rect">
+            <a:avLst/>
+          </a:prstGeom>
+        </p:spPr>
+      </p:pic>
+      <p:pic>
+        <p:nvPicPr>
+          <p:cNvPr id="4" name="Picture 3" descr="pingpong-bw-mx.pdf"/>
+          <p:cNvPicPr>
+            <a:picLocks noChangeAspect="1"/>
+          </p:cNvPicPr>
+          <p:nvPr/>
+        </p:nvPicPr>
+        <p:blipFill>
+          <a:blip r:embed="rId3">
+            <a:extLst>
+              <a:ext uri="{28A0092B-C50C-407E-A947-70E740481C1C}">
+                <a14:useLocalDpi xmlns:a14="http://schemas.microsoft.com/office/drawing/2010/main" val="0"/>
+              </a:ext>
+            </a:extLst>
+          </a:blip>
+          <a:stretch>
+            <a:fillRect/>
+          </a:stretch>
+        </p:blipFill>
+        <p:spPr>
+          <a:xfrm>
+            <a:off x="4572000" y="1792256"/>
+            <a:ext cx="4572000" cy="3200400"/>
+          </a:xfrm>
+          <a:prstGeom prst="rect">
+            <a:avLst/>
+          </a:prstGeom>
+        </p:spPr>
+      </p:pic>
+    </p:spTree>
+    <p:extLst>
+      <p:ext uri="{BB962C8B-B14F-4D97-AF65-F5344CB8AC3E}">
+        <p14:creationId xmlns:p14="http://schemas.microsoft.com/office/powerpoint/2010/main" val="2767896140"/>
+      </p:ext>
+    </p:extLst>
+  </p:cSld>
+  <p:clrMapOvr>
+    <a:masterClrMapping/>
+  </p:clrMapOvr>
+  <p:timing>
+    <p:tnLst>
+      <p:par>
+        <p:cTn id="1" dur="indefinite" restart="never" nodeType="tmRoot"/>
+      </p:par>
+    </p:tnLst>
+  </p:timing>
+</p:sld>
+</file>
+
+<file path=ppt/slides/slide26.xml><?xml version="1.0" encoding="utf-8"?>
+<p:sld xmlns:a="http://schemas.openxmlformats.org/drawingml/2006/main" xmlns:r="http://schemas.openxmlformats.org/officeDocument/2006/relationships" xmlns:p="http://schemas.openxmlformats.org/presentationml/2006/main">
+  <p:cSld>
+    <p:spTree>
+      <p:nvGrpSpPr>
+        <p:cNvPr id="1" name=""/>
+        <p:cNvGrpSpPr/>
+        <p:nvPr/>
+      </p:nvGrpSpPr>
+      <p:grpSpPr>
+        <a:xfrm>
+          <a:off x="0" y="0"/>
+          <a:ext cx="0" cy="0"/>
+          <a:chOff x="0" y="0"/>
+          <a:chExt cx="0" cy="0"/>
+        </a:xfrm>
+      </p:grpSpPr>
+      <p:sp>
+        <p:nvSpPr>
+          <p:cNvPr id="2" name="Title 1"/>
+          <p:cNvSpPr>
+            <a:spLocks noGrp="1"/>
+          </p:cNvSpPr>
+          <p:nvPr>
+            <p:ph type="title"/>
+          </p:nvPr>
+        </p:nvSpPr>
+        <p:spPr>
+          <a:xfrm>
+            <a:off x="111098" y="152400"/>
+            <a:ext cx="8229600" cy="496290"/>
+          </a:xfrm>
+        </p:spPr>
+        <p:txBody>
+          <a:bodyPr/>
+          <a:lstStyle/>
+          <a:p>
+            <a:r>
+              <a:rPr lang="en-US" dirty="0"/>
               <a:t>CCI/Portals Performance</a:t>
             </a:r>
           </a:p>
@@ -4903,14 +5176,14 @@
   <p:timing>
     <p:tnLst>
       <p:par>
-        <p:cTn xmlns:p14="http://schemas.microsoft.com/office/powerpoint/2010/main" id="1" dur="indefinite" restart="never" nodeType="tmRoot"/>
+        <p:cTn id="1" dur="indefinite" restart="never" nodeType="tmRoot"/>
       </p:par>
     </p:tnLst>
   </p:timing>
 </p:sld>
 </file>
 
-<file path=ppt/slides/slide26.xml><?xml version="1.0" encoding="utf-8"?>
+<file path=ppt/slides/slide27.xml><?xml version="1.0" encoding="utf-8"?>
 <p:sld xmlns:a="http://schemas.openxmlformats.org/drawingml/2006/main" xmlns:r="http://schemas.openxmlformats.org/officeDocument/2006/relationships" xmlns:p="http://schemas.openxmlformats.org/presentationml/2006/main">
   <p:cSld>
     <p:spTree>
@@ -5115,14 +5388,14 @@
   <p:timing>
     <p:tnLst>
       <p:par>
-        <p:cTn xmlns:p14="http://schemas.microsoft.com/office/powerpoint/2010/main" id="1" dur="indefinite" restart="never" nodeType="tmRoot"/>
+        <p:cTn id="1" dur="indefinite" restart="never" nodeType="tmRoot"/>
       </p:par>
     </p:tnLst>
   </p:timing>
 </p:sld>
 </file>
 
-<file path=ppt/slides/slide27.xml><?xml version="1.0" encoding="utf-8"?>
+<file path=ppt/slides/slide28.xml><?xml version="1.0" encoding="utf-8"?>
 <p:sld xmlns:a="http://schemas.openxmlformats.org/drawingml/2006/main" xmlns:r="http://schemas.openxmlformats.org/officeDocument/2006/relationships" xmlns:p="http://schemas.openxmlformats.org/presentationml/2006/main">
   <p:cSld>
     <p:spTree>
@@ -5282,7 +5555,7 @@
   <p:timing>
     <p:tnLst>
       <p:par>
-        <p:cTn xmlns:p14="http://schemas.microsoft.com/office/powerpoint/2010/main" id="1" dur="indefinite" restart="never" nodeType="tmRoot"/>
+        <p:cTn id="1" dur="indefinite" restart="never" nodeType="tmRoot"/>
       </p:par>
     </p:tnLst>
   </p:timing>
@@ -5316,20 +5589,16 @@
             <p:ph type="title"/>
           </p:nvPr>
         </p:nvSpPr>
-        <p:spPr>
-          <a:xfrm>
-            <a:off x="111098" y="152400"/>
-            <a:ext cx="8229600" cy="496290"/>
-          </a:xfrm>
-        </p:spPr>
+        <p:spPr/>
         <p:txBody>
           <a:bodyPr/>
           <a:lstStyle/>
           <a:p>
             <a:r>
-              <a:rPr lang="en-US" dirty="0"/>
-              <a:t>Distributed application types</a:t>
-            </a:r>
+              <a:rPr lang="en-US" dirty="0" smtClean="0"/>
+              <a:t>The context</a:t>
+            </a:r>
+            <a:endParaRPr lang="en-US" dirty="0"/>
           </a:p>
         </p:txBody>
       </p:sp>
@@ -5346,7 +5615,7 @@
         <p:spPr>
           <a:xfrm>
             <a:off x="111204" y="1344823"/>
-            <a:ext cx="8229600" cy="4231927"/>
+            <a:ext cx="8229600" cy="4471993"/>
           </a:xfrm>
         </p:spPr>
         <p:txBody>
@@ -5354,62 +5623,74 @@
           <a:lstStyle/>
           <a:p>
             <a:r>
-              <a:rPr lang="en-US" dirty="0"/>
-              <a:t>Client-Server</a:t>
-            </a:r>
-          </a:p>
-          <a:p>
-            <a:pPr lvl="1"/>
-            <a:r>
-              <a:rPr lang="en-US" dirty="0"/>
-              <a:t>Web servers</a:t>
-            </a:r>
-          </a:p>
-          <a:p>
-            <a:pPr lvl="1"/>
-            <a:r>
-              <a:rPr lang="en-US" dirty="0"/>
-              <a:t>File Systems such as NFS, Lustre</a:t>
-            </a:r>
-          </a:p>
-          <a:p>
-            <a:pPr lvl="1"/>
-            <a:r>
-              <a:rPr lang="en-US" dirty="0"/>
-              <a:t>High Frequency Trading (HFT)</a:t>
-            </a:r>
-          </a:p>
-          <a:p>
-            <a:pPr lvl="1"/>
-            <a:r>
-              <a:rPr lang="en-US" dirty="0"/>
-              <a:t>Media Streaming (IPTV)</a:t>
-            </a:r>
-          </a:p>
-          <a:p>
-            <a:r>
-              <a:rPr lang="en-US" dirty="0"/>
-              <a:t>Peer-to-peer</a:t>
-            </a:r>
-          </a:p>
-          <a:p>
-            <a:pPr lvl="1"/>
-            <a:r>
-              <a:rPr lang="en-US" dirty="0"/>
-              <a:t>BigTable</a:t>
-            </a:r>
-          </a:p>
-          <a:p>
-            <a:pPr lvl="1"/>
-            <a:r>
-              <a:rPr lang="en-US" dirty="0"/>
-              <a:t>Cassandra</a:t>
-            </a:r>
-          </a:p>
-          <a:p>
-            <a:r>
-              <a:rPr lang="en-US" dirty="0"/>
-              <a:t>HPC/MPI</a:t>
+              <a:rPr lang="en-US" dirty="0" smtClean="0"/>
+              <a:t>Application control one side of the pipe:</a:t>
+            </a:r>
+          </a:p>
+          <a:p>
+            <a:pPr lvl="1"/>
+            <a:r>
+              <a:rPr lang="en-US" dirty="0" smtClean="0"/>
+              <a:t>Common language: IP on the wire, Socket interface on the host.</a:t>
+            </a:r>
+          </a:p>
+          <a:p>
+            <a:pPr lvl="1"/>
+            <a:r>
+              <a:rPr lang="en-US" dirty="0" smtClean="0"/>
+              <a:t>Applications: web service, media delivery, trading exchange.</a:t>
+            </a:r>
+          </a:p>
+          <a:p>
+            <a:pPr lvl="1"/>
+            <a:r>
+              <a:rPr lang="en-US" dirty="0" smtClean="0"/>
+              <a:t>Not going away, way too much legacy.</a:t>
+            </a:r>
+          </a:p>
+          <a:p>
+            <a:r>
+              <a:rPr lang="en-US" dirty="0" smtClean="0"/>
+              <a:t>Application controls both sides:</a:t>
+            </a:r>
+          </a:p>
+          <a:p>
+            <a:pPr lvl="1"/>
+            <a:r>
+              <a:rPr lang="en-US" dirty="0" smtClean="0"/>
+              <a:t>No required wire protocol or host programing interface.</a:t>
+            </a:r>
+          </a:p>
+          <a:p>
+            <a:pPr lvl="1"/>
+            <a:r>
+              <a:rPr lang="en-US" dirty="0" smtClean="0"/>
+              <a:t>Applications: back-ends, database, storage</a:t>
+            </a:r>
+          </a:p>
+          <a:p>
+            <a:pPr lvl="2"/>
+            <a:r>
+              <a:rPr lang="en-US" dirty="0" err="1" smtClean="0"/>
+              <a:t>Memcached</a:t>
+            </a:r>
+            <a:r>
+              <a:rPr lang="en-US" dirty="0" smtClean="0"/>
+              <a:t>, Big Table, Cassandra.</a:t>
+            </a:r>
+          </a:p>
+          <a:p>
+            <a:pPr lvl="1"/>
+            <a:r>
+              <a:rPr lang="en-US" dirty="0" smtClean="0"/>
+              <a:t>Socket interface hinder networking innovation.</a:t>
+            </a:r>
+          </a:p>
+          <a:p>
+            <a:pPr lvl="1"/>
+            <a:r>
+              <a:rPr lang="en-US" dirty="0" smtClean="0"/>
+              <a:t>Gazillions of vendor-specific interfaces available (dead or alive).</a:t>
             </a:r>
           </a:p>
         </p:txBody>
@@ -5417,20 +5698,13 @@
     </p:spTree>
     <p:extLst>
       <p:ext uri="{BB962C8B-B14F-4D97-AF65-F5344CB8AC3E}">
-        <p14:creationId xmlns:p14="http://schemas.microsoft.com/office/powerpoint/2010/main" val="2976769819"/>
+        <p14:creationId xmlns:p14="http://schemas.microsoft.com/office/powerpoint/2010/main" val="2858392868"/>
       </p:ext>
     </p:extLst>
   </p:cSld>
   <p:clrMapOvr>
     <a:masterClrMapping/>
   </p:clrMapOvr>
-  <p:timing>
-    <p:tnLst>
-      <p:par>
-        <p:cTn xmlns:p14="http://schemas.microsoft.com/office/powerpoint/2010/main" id="1" dur="indefinite" restart="never" nodeType="tmRoot"/>
-      </p:par>
-    </p:tnLst>
-  </p:timing>
 </p:sld>
 </file>
 
@@ -5461,20 +5735,16 @@
             <p:ph type="title"/>
           </p:nvPr>
         </p:nvSpPr>
-        <p:spPr>
-          <a:xfrm>
-            <a:off x="111098" y="152400"/>
-            <a:ext cx="8229600" cy="496290"/>
-          </a:xfrm>
-        </p:spPr>
+        <p:spPr/>
         <p:txBody>
           <a:bodyPr/>
           <a:lstStyle/>
           <a:p>
             <a:r>
-              <a:rPr lang="en-US" dirty="0"/>
-              <a:t>Distributed application needs</a:t>
-            </a:r>
+              <a:rPr lang="en-US" dirty="0" smtClean="0"/>
+              <a:t>The problem</a:t>
+            </a:r>
+            <a:endParaRPr lang="en-US" dirty="0"/>
           </a:p>
         </p:txBody>
       </p:sp>
@@ -5491,7 +5761,7 @@
         <p:spPr>
           <a:xfrm>
             <a:off x="111204" y="1344823"/>
-            <a:ext cx="8229600" cy="3795911"/>
+            <a:ext cx="8229600" cy="4092402"/>
           </a:xfrm>
         </p:spPr>
         <p:txBody>
@@ -5499,55 +5769,68 @@
           <a:lstStyle/>
           <a:p>
             <a:r>
-              <a:rPr lang="en-US" dirty="0"/>
-              <a:t>Dynamic process management</a:t>
-            </a:r>
-          </a:p>
-          <a:p>
-            <a:pPr lvl="1"/>
-            <a:r>
-              <a:rPr lang="en-US" dirty="0"/>
-              <a:t>Peers come and go – not statically known a priori</a:t>
-            </a:r>
-          </a:p>
-          <a:p>
-            <a:r>
-              <a:rPr lang="en-US" dirty="0"/>
-              <a:t>Scalability</a:t>
-            </a:r>
-          </a:p>
-          <a:p>
-            <a:pPr lvl="1"/>
-            <a:r>
-              <a:rPr lang="en-US" dirty="0"/>
-              <a:t>Approaching 10^6 nodes and 10^9 cores</a:t>
-            </a:r>
-          </a:p>
-          <a:p>
-            <a:pPr lvl="1"/>
-            <a:r>
-              <a:rPr lang="en-US" dirty="0"/>
-              <a:t>Time and space cannot grow linearly with number of peers</a:t>
-            </a:r>
-          </a:p>
-          <a:p>
-            <a:r>
-              <a:rPr lang="en-US" dirty="0"/>
-              <a:t>Fault tolerance</a:t>
-            </a:r>
-          </a:p>
-          <a:p>
-            <a:pPr lvl="1"/>
-            <a:r>
-              <a:rPr lang="en-US" dirty="0"/>
-              <a:t>Failures increase with component count</a:t>
-            </a:r>
-          </a:p>
-          <a:p>
-            <a:pPr lvl="1"/>
-            <a:r>
-              <a:rPr lang="en-US" dirty="0"/>
-              <a:t>Need to contain faults to a single peer (i.e. fault isolation)</a:t>
+              <a:rPr lang="en-US" dirty="0" smtClean="0"/>
+              <a:t>Application </a:t>
+            </a:r>
+            <a:r>
+              <a:rPr lang="en-US" dirty="0" err="1" smtClean="0"/>
+              <a:t>developpers</a:t>
+            </a:r>
+            <a:r>
+              <a:rPr lang="en-US" dirty="0" smtClean="0"/>
+              <a:t>:</a:t>
+            </a:r>
+          </a:p>
+          <a:p>
+            <a:pPr lvl="1"/>
+            <a:r>
+              <a:rPr lang="en-US" dirty="0" smtClean="0"/>
+              <a:t>Stick with Sockets.</a:t>
+            </a:r>
+          </a:p>
+          <a:p>
+            <a:pPr lvl="1"/>
+            <a:r>
+              <a:rPr lang="en-US" dirty="0" smtClean="0"/>
+              <a:t>Lock themselves with a vendor-specific interface.</a:t>
+            </a:r>
+          </a:p>
+          <a:p>
+            <a:pPr lvl="1"/>
+            <a:r>
+              <a:rPr lang="en-US" dirty="0" smtClean="0"/>
+              <a:t>Support a number of different interfaces.</a:t>
+            </a:r>
+          </a:p>
+          <a:p>
+            <a:pPr lvl="1"/>
+            <a:endParaRPr lang="en-US" dirty="0" smtClean="0"/>
+          </a:p>
+          <a:p>
+            <a:r>
+              <a:rPr lang="en-US" dirty="0" smtClean="0"/>
+              <a:t>Network vendors:</a:t>
+            </a:r>
+          </a:p>
+          <a:p>
+            <a:pPr lvl="1"/>
+            <a:r>
+              <a:rPr lang="en-US" dirty="0" smtClean="0"/>
+              <a:t>Cut corners to improve Sockets.</a:t>
+            </a:r>
+          </a:p>
+          <a:p>
+            <a:pPr lvl="1"/>
+            <a:r>
+              <a:rPr lang="en-US" dirty="0" smtClean="0"/>
+              <a:t>Push their interface as the Only True One.</a:t>
+            </a:r>
+          </a:p>
+          <a:p>
+            <a:pPr lvl="1"/>
+            <a:r>
+              <a:rPr lang="en-US" dirty="0" smtClean="0"/>
+              <a:t>Support a number of different applications.</a:t>
             </a:r>
           </a:p>
         </p:txBody>
@@ -5555,20 +5838,13 @@
     </p:spTree>
     <p:extLst>
       <p:ext uri="{BB962C8B-B14F-4D97-AF65-F5344CB8AC3E}">
-        <p14:creationId xmlns:p14="http://schemas.microsoft.com/office/powerpoint/2010/main" val="698086324"/>
+        <p14:creationId xmlns:p14="http://schemas.microsoft.com/office/powerpoint/2010/main" val="1991255280"/>
       </p:ext>
     </p:extLst>
   </p:cSld>
   <p:clrMapOvr>
     <a:masterClrMapping/>
   </p:clrMapOvr>
-  <p:timing>
-    <p:tnLst>
-      <p:par>
-        <p:cTn xmlns:p14="http://schemas.microsoft.com/office/powerpoint/2010/main" id="1" dur="indefinite" restart="never" nodeType="tmRoot"/>
-      </p:par>
-    </p:tnLst>
-  </p:timing>
 </p:sld>
 </file>
 
@@ -5629,6 +5905,144 @@
         <p:spPr>
           <a:xfrm>
             <a:off x="111204" y="1344823"/>
+            <a:ext cx="8229600" cy="3795911"/>
+          </a:xfrm>
+        </p:spPr>
+        <p:txBody>
+          <a:bodyPr/>
+          <a:lstStyle/>
+          <a:p>
+            <a:r>
+              <a:rPr lang="en-US" dirty="0"/>
+              <a:t>Dynamic process management</a:t>
+            </a:r>
+          </a:p>
+          <a:p>
+            <a:pPr lvl="1"/>
+            <a:r>
+              <a:rPr lang="en-US" dirty="0"/>
+              <a:t>Peers come and go – not statically known a priori</a:t>
+            </a:r>
+          </a:p>
+          <a:p>
+            <a:r>
+              <a:rPr lang="en-US" dirty="0"/>
+              <a:t>Scalability</a:t>
+            </a:r>
+          </a:p>
+          <a:p>
+            <a:pPr lvl="1"/>
+            <a:r>
+              <a:rPr lang="en-US" dirty="0"/>
+              <a:t>Approaching 10^6 nodes and 10^9 cores</a:t>
+            </a:r>
+          </a:p>
+          <a:p>
+            <a:pPr lvl="1"/>
+            <a:r>
+              <a:rPr lang="en-US" dirty="0"/>
+              <a:t>Time and space cannot grow linearly with number of peers</a:t>
+            </a:r>
+          </a:p>
+          <a:p>
+            <a:r>
+              <a:rPr lang="en-US" dirty="0"/>
+              <a:t>Fault tolerance</a:t>
+            </a:r>
+          </a:p>
+          <a:p>
+            <a:pPr lvl="1"/>
+            <a:r>
+              <a:rPr lang="en-US" dirty="0"/>
+              <a:t>Failures increase with component count</a:t>
+            </a:r>
+          </a:p>
+          <a:p>
+            <a:pPr lvl="1"/>
+            <a:r>
+              <a:rPr lang="en-US" dirty="0"/>
+              <a:t>Need to contain faults to a single peer (i.e. fault isolation)</a:t>
+            </a:r>
+          </a:p>
+        </p:txBody>
+      </p:sp>
+    </p:spTree>
+    <p:extLst>
+      <p:ext uri="{BB962C8B-B14F-4D97-AF65-F5344CB8AC3E}">
+        <p14:creationId xmlns:p14="http://schemas.microsoft.com/office/powerpoint/2010/main" val="698086324"/>
+      </p:ext>
+    </p:extLst>
+  </p:cSld>
+  <p:clrMapOvr>
+    <a:masterClrMapping/>
+  </p:clrMapOvr>
+  <p:timing>
+    <p:tnLst>
+      <p:par>
+        <p:cTn id="1" dur="indefinite" restart="never" nodeType="tmRoot"/>
+      </p:par>
+    </p:tnLst>
+  </p:timing>
+</p:sld>
+</file>
+
+<file path=ppt/slides/slide6.xml><?xml version="1.0" encoding="utf-8"?>
+<p:sld xmlns:a="http://schemas.openxmlformats.org/drawingml/2006/main" xmlns:r="http://schemas.openxmlformats.org/officeDocument/2006/relationships" xmlns:p="http://schemas.openxmlformats.org/presentationml/2006/main">
+  <p:cSld>
+    <p:spTree>
+      <p:nvGrpSpPr>
+        <p:cNvPr id="1" name=""/>
+        <p:cNvGrpSpPr/>
+        <p:nvPr/>
+      </p:nvGrpSpPr>
+      <p:grpSpPr>
+        <a:xfrm>
+          <a:off x="0" y="0"/>
+          <a:ext cx="0" cy="0"/>
+          <a:chOff x="0" y="0"/>
+          <a:chExt cx="0" cy="0"/>
+        </a:xfrm>
+      </p:grpSpPr>
+      <p:sp>
+        <p:nvSpPr>
+          <p:cNvPr id="2" name="Title 1"/>
+          <p:cNvSpPr>
+            <a:spLocks noGrp="1"/>
+          </p:cNvSpPr>
+          <p:nvPr>
+            <p:ph type="title"/>
+          </p:nvPr>
+        </p:nvSpPr>
+        <p:spPr>
+          <a:xfrm>
+            <a:off x="111098" y="152400"/>
+            <a:ext cx="8229600" cy="496290"/>
+          </a:xfrm>
+        </p:spPr>
+        <p:txBody>
+          <a:bodyPr/>
+          <a:lstStyle/>
+          <a:p>
+            <a:r>
+              <a:rPr lang="en-US" dirty="0"/>
+              <a:t>Distributed application needs</a:t>
+            </a:r>
+          </a:p>
+        </p:txBody>
+      </p:sp>
+      <p:sp>
+        <p:nvSpPr>
+          <p:cNvPr id="3" name="Content Placeholder 2"/>
+          <p:cNvSpPr>
+            <a:spLocks noGrp="1"/>
+          </p:cNvSpPr>
+          <p:nvPr>
+            <p:ph idx="1"/>
+          </p:nvPr>
+        </p:nvSpPr>
+        <p:spPr>
+          <a:xfrm>
+            <a:off x="111204" y="1344823"/>
             <a:ext cx="8229600" cy="4665892"/>
           </a:xfrm>
         </p:spPr>
@@ -5717,14 +6131,14 @@
   <p:timing>
     <p:tnLst>
       <p:par>
-        <p:cTn xmlns:p14="http://schemas.microsoft.com/office/powerpoint/2010/main" id="1" dur="indefinite" restart="never" nodeType="tmRoot"/>
+        <p:cTn id="1" dur="indefinite" restart="never" nodeType="tmRoot"/>
       </p:par>
     </p:tnLst>
   </p:timing>
 </p:sld>
 </file>
 
-<file path=ppt/slides/slide6.xml><?xml version="1.0" encoding="utf-8"?>
+<file path=ppt/slides/slide7.xml><?xml version="1.0" encoding="utf-8"?>
 <p:sld xmlns:a="http://schemas.openxmlformats.org/drawingml/2006/main" xmlns:r="http://schemas.openxmlformats.org/officeDocument/2006/relationships" xmlns:p="http://schemas.openxmlformats.org/presentationml/2006/main">
   <p:cSld>
     <p:spTree>
@@ -6039,110 +6453,7 @@
   <p:timing>
     <p:tnLst>
       <p:par>
-        <p:cTn xmlns:p14="http://schemas.microsoft.com/office/powerpoint/2010/main" id="1" dur="indefinite" restart="never" nodeType="tmRoot"/>
-      </p:par>
-    </p:tnLst>
-  </p:timing>
-</p:sld>
-</file>
-
-<file path=ppt/slides/slide7.xml><?xml version="1.0" encoding="utf-8"?>
-<p:sld xmlns:a="http://schemas.openxmlformats.org/drawingml/2006/main" xmlns:r="http://schemas.openxmlformats.org/officeDocument/2006/relationships" xmlns:p="http://schemas.openxmlformats.org/presentationml/2006/main">
-  <p:cSld>
-    <p:spTree>
-      <p:nvGrpSpPr>
-        <p:cNvPr id="1" name=""/>
-        <p:cNvGrpSpPr/>
-        <p:nvPr/>
-      </p:nvGrpSpPr>
-      <p:grpSpPr>
-        <a:xfrm>
-          <a:off x="0" y="0"/>
-          <a:ext cx="0" cy="0"/>
-          <a:chOff x="0" y="0"/>
-          <a:chExt cx="0" cy="0"/>
-        </a:xfrm>
-      </p:grpSpPr>
-      <p:sp>
-        <p:nvSpPr>
-          <p:cNvPr id="2" name="Title 1"/>
-          <p:cNvSpPr>
-            <a:spLocks noGrp="1"/>
-          </p:cNvSpPr>
-          <p:nvPr>
-            <p:ph type="title"/>
-          </p:nvPr>
-        </p:nvSpPr>
-        <p:spPr>
-          <a:xfrm>
-            <a:off x="111098" y="152400"/>
-            <a:ext cx="8229600" cy="496290"/>
-          </a:xfrm>
-        </p:spPr>
-        <p:txBody>
-          <a:bodyPr/>
-          <a:lstStyle/>
-          <a:p>
-            <a:r>
-              <a:rPr lang="en-US" dirty="0"/>
-              <a:t>Current APIs</a:t>
-            </a:r>
-          </a:p>
-        </p:txBody>
-      </p:sp>
-      <p:sp>
-        <p:nvSpPr>
-          <p:cNvPr id="3" name="Content Placeholder 2"/>
-          <p:cNvSpPr>
-            <a:spLocks noGrp="1"/>
-          </p:cNvSpPr>
-          <p:nvPr>
-            <p:ph idx="1"/>
-          </p:nvPr>
-        </p:nvSpPr>
-        <p:spPr>
-          <a:xfrm>
-            <a:off x="111204" y="1344823"/>
-            <a:ext cx="8229600" cy="1621982"/>
-          </a:xfrm>
-        </p:spPr>
-        <p:txBody>
-          <a:bodyPr/>
-          <a:lstStyle/>
-          <a:p>
-            <a:r>
-              <a:rPr lang="en-US" dirty="0"/>
-              <a:t>Sockets</a:t>
-            </a:r>
-          </a:p>
-          <a:p>
-            <a:r>
-              <a:rPr lang="en-US" dirty="0"/>
-              <a:t>MPI</a:t>
-            </a:r>
-          </a:p>
-          <a:p>
-            <a:r>
-              <a:rPr lang="en-US" dirty="0"/>
-              <a:t>Specialized</a:t>
-            </a:r>
-          </a:p>
-        </p:txBody>
-      </p:sp>
-    </p:spTree>
-    <p:extLst>
-      <p:ext uri="{BB962C8B-B14F-4D97-AF65-F5344CB8AC3E}">
-        <p14:creationId xmlns:p14="http://schemas.microsoft.com/office/powerpoint/2010/main" val="3007031719"/>
-      </p:ext>
-    </p:extLst>
-  </p:cSld>
-  <p:clrMapOvr>
-    <a:masterClrMapping/>
-  </p:clrMapOvr>
-  <p:timing>
-    <p:tnLst>
-      <p:par>
-        <p:cTn xmlns:p14="http://schemas.microsoft.com/office/powerpoint/2010/main" id="1" dur="indefinite" restart="never" nodeType="tmRoot"/>
+        <p:cTn id="1" dur="indefinite" restart="never" nodeType="tmRoot"/>
       </p:par>
     </p:tnLst>
   </p:timing>
@@ -6187,9 +6498,10 @@
           <a:lstStyle/>
           <a:p>
             <a:r>
-              <a:rPr lang="en-US" dirty="0"/>
-              <a:t>Sockets</a:t>
-            </a:r>
+              <a:rPr lang="en-US" dirty="0" smtClean="0"/>
+              <a:t>The landscape</a:t>
+            </a:r>
+            <a:endParaRPr lang="en-US" dirty="0"/>
           </a:p>
         </p:txBody>
       </p:sp>
@@ -6206,7 +6518,7 @@
         <p:spPr>
           <a:xfrm>
             <a:off x="111204" y="1344823"/>
-            <a:ext cx="8229600" cy="5063950"/>
+            <a:ext cx="8229600" cy="1621982"/>
           </a:xfrm>
         </p:spPr>
         <p:txBody>
@@ -6215,65 +6527,19 @@
           <a:p>
             <a:r>
               <a:rPr lang="en-US" dirty="0"/>
-              <a:t>Most widely used</a:t>
-            </a:r>
-          </a:p>
-          <a:p>
-            <a:pPr lvl="1"/>
-            <a:r>
-              <a:rPr lang="en-US" dirty="0"/>
-              <a:t>Simple API</a:t>
-            </a:r>
-          </a:p>
-          <a:p>
-            <a:pPr lvl="1"/>
-            <a:r>
-              <a:rPr lang="en-US" dirty="0"/>
-              <a:t>Robustness (failure tolerant)</a:t>
-            </a:r>
-          </a:p>
-          <a:p>
-            <a:pPr lvl="1"/>
-            <a:r>
-              <a:rPr lang="en-US" dirty="0"/>
-              <a:t>Implicit buffering</a:t>
-            </a:r>
-          </a:p>
-          <a:p>
-            <a:r>
-              <a:rPr lang="en-US" dirty="0"/>
-              <a:t>Stream and datagram modes</a:t>
-            </a:r>
-          </a:p>
-          <a:p>
-            <a:r>
-              <a:rPr lang="en-US" dirty="0"/>
-              <a:t>Connected and connectionless modes</a:t>
-            </a:r>
-          </a:p>
-          <a:p>
-            <a:r>
-              <a:rPr lang="en-US" dirty="0"/>
-              <a:t>Client/server semantics for connected mode</a:t>
-            </a:r>
-          </a:p>
-          <a:p>
-            <a:r>
-              <a:rPr lang="en-US" dirty="0"/>
-              <a:t>Asynchrony via buffered sends and receives</a:t>
-            </a:r>
-          </a:p>
-          <a:p>
-            <a:pPr lvl="1"/>
-            <a:r>
-              <a:rPr lang="en-US" dirty="0"/>
-              <a:t>Requires more CPU work which lowers throughput</a:t>
-            </a:r>
-          </a:p>
-          <a:p>
-            <a:r>
-              <a:rPr lang="en-US" dirty="0"/>
-              <a:t>SOCK_STREAM inherits TCP performance constraints</a:t>
+              <a:t>Sockets</a:t>
+            </a:r>
+          </a:p>
+          <a:p>
+            <a:r>
+              <a:rPr lang="en-US" dirty="0"/>
+              <a:t>MPI</a:t>
+            </a:r>
+          </a:p>
+          <a:p>
+            <a:r>
+              <a:rPr lang="en-US" dirty="0"/>
+              <a:t>Specialized</a:t>
             </a:r>
           </a:p>
         </p:txBody>
@@ -6281,7 +6547,7 @@
     </p:spTree>
     <p:extLst>
       <p:ext uri="{BB962C8B-B14F-4D97-AF65-F5344CB8AC3E}">
-        <p14:creationId xmlns:p14="http://schemas.microsoft.com/office/powerpoint/2010/main" val="3932495684"/>
+        <p14:creationId xmlns:p14="http://schemas.microsoft.com/office/powerpoint/2010/main" val="3007031719"/>
       </p:ext>
     </p:extLst>
   </p:cSld>
@@ -6291,7 +6557,7 @@
   <p:timing>
     <p:tnLst>
       <p:par>
-        <p:cTn xmlns:p14="http://schemas.microsoft.com/office/powerpoint/2010/main" id="1" dur="indefinite" restart="never" nodeType="tmRoot"/>
+        <p:cTn id="1" dur="indefinite" restart="never" nodeType="tmRoot"/>
       </p:par>
     </p:tnLst>
   </p:timing>
@@ -6337,7 +6603,7 @@
           <a:p>
             <a:r>
               <a:rPr lang="en-US" dirty="0"/>
-              <a:t>MPI</a:t>
+              <a:t>Sockets</a:t>
             </a:r>
           </a:p>
         </p:txBody>
@@ -6354,8 +6620,8 @@
         </p:nvSpPr>
         <p:spPr>
           <a:xfrm>
-            <a:off x="111204" y="1143000"/>
-            <a:ext cx="8229600" cy="5395809"/>
+            <a:off x="111204" y="1344823"/>
+            <a:ext cx="8229600" cy="5063950"/>
           </a:xfrm>
         </p:spPr>
         <p:txBody>
@@ -6363,96 +6629,74 @@
           <a:lstStyle/>
           <a:p>
             <a:r>
-              <a:rPr lang="en-US" sz="2400" dirty="0"/>
-              <a:t>Dominant interface in HPC</a:t>
-            </a:r>
-          </a:p>
-          <a:p>
-            <a:r>
-              <a:rPr lang="en-US" sz="2400" dirty="0"/>
-              <a:t>Provides scalability</a:t>
-            </a:r>
-          </a:p>
-          <a:p>
-            <a:r>
-              <a:rPr lang="en-US" sz="2400" dirty="0"/>
-              <a:t>Rich API (i.e. complicated)</a:t>
-            </a:r>
-          </a:p>
-          <a:p>
-            <a:r>
-              <a:rPr lang="en-US" sz="2400" dirty="0"/>
-              <a:t>Point-to-point, collective, and one-sided</a:t>
-            </a:r>
-          </a:p>
-          <a:p>
-            <a:r>
-              <a:rPr lang="en-US" sz="2400" dirty="0"/>
-              <a:t>Blocking and non-blocking</a:t>
-            </a:r>
-          </a:p>
-          <a:p>
-            <a:r>
-              <a:rPr lang="en-US" sz="2400" dirty="0"/>
-              <a:t>Synchronous, asynchronous, and ready modes</a:t>
-            </a:r>
-          </a:p>
-          <a:p>
-            <a:r>
-              <a:rPr lang="en-US" sz="2400" dirty="0"/>
-              <a:t>Uses communication groups (communicators)</a:t>
-            </a:r>
-          </a:p>
-          <a:p>
-            <a:pPr lvl="1"/>
-            <a:r>
-              <a:rPr lang="en-US" sz="2100" dirty="0"/>
-              <a:t>May include all process or a subset of processes</a:t>
-            </a:r>
-          </a:p>
-          <a:p>
-            <a:r>
-              <a:rPr lang="en-US" sz="2400" dirty="0"/>
-              <a:t>Does provide a notion of dynamic process management</a:t>
-            </a:r>
-          </a:p>
-          <a:p>
-            <a:pPr lvl="1"/>
-            <a:r>
-              <a:rPr lang="en-US" sz="2100" dirty="0" err="1"/>
-              <a:t>Accept</a:t>
-            </a:r>
-            <a:r>
-              <a:rPr lang="en-US" sz="2100" dirty="0"/>
-              <a:t>(), </a:t>
-            </a:r>
-            <a:r>
-              <a:rPr lang="en-US" sz="2100" dirty="0" err="1"/>
-              <a:t>Connect</a:t>
-            </a:r>
-            <a:r>
-              <a:rPr lang="en-US" sz="2100" dirty="0"/>
-              <a:t>() immature, infrequently provided, and much less used</a:t>
-            </a:r>
-          </a:p>
-          <a:p>
-            <a:pPr lvl="1"/>
-            <a:r>
-              <a:rPr lang="en-US" sz="2100" dirty="0"/>
-              <a:t>Imposes high overhead, not </a:t>
-            </a:r>
-            <a:r>
-              <a:rPr lang="en-US" sz="2100" dirty="0" err="1"/>
-              <a:t>performant</a:t>
-            </a:r>
-            <a:endParaRPr lang="en-US" sz="2100" dirty="0"/>
+              <a:rPr lang="en-US" dirty="0"/>
+              <a:t>Most widely used</a:t>
+            </a:r>
+          </a:p>
+          <a:p>
+            <a:pPr lvl="1"/>
+            <a:r>
+              <a:rPr lang="en-US" dirty="0"/>
+              <a:t>Simple API</a:t>
+            </a:r>
+          </a:p>
+          <a:p>
+            <a:pPr lvl="1"/>
+            <a:r>
+              <a:rPr lang="en-US" dirty="0"/>
+              <a:t>Robustness (failure tolerant)</a:t>
+            </a:r>
+          </a:p>
+          <a:p>
+            <a:pPr lvl="1"/>
+            <a:r>
+              <a:rPr lang="en-US" dirty="0"/>
+              <a:t>Implicit buffering</a:t>
+            </a:r>
+          </a:p>
+          <a:p>
+            <a:r>
+              <a:rPr lang="en-US" dirty="0"/>
+              <a:t>Stream and datagram modes</a:t>
+            </a:r>
+          </a:p>
+          <a:p>
+            <a:r>
+              <a:rPr lang="en-US" dirty="0"/>
+              <a:t>Connected and connectionless modes</a:t>
+            </a:r>
+          </a:p>
+          <a:p>
+            <a:r>
+              <a:rPr lang="en-US" dirty="0"/>
+              <a:t>Client/server semantics for connected mode</a:t>
+            </a:r>
+          </a:p>
+          <a:p>
+            <a:r>
+              <a:rPr lang="en-US" dirty="0"/>
+              <a:t>Asynchrony via buffered sends and receives</a:t>
+            </a:r>
+          </a:p>
+          <a:p>
+            <a:pPr lvl="1"/>
+            <a:r>
+              <a:rPr lang="en-US" dirty="0"/>
+              <a:t>Requires more CPU work which lowers throughput</a:t>
+            </a:r>
+          </a:p>
+          <a:p>
+            <a:r>
+              <a:rPr lang="en-US" dirty="0"/>
+              <a:t>SOCK_STREAM inherits TCP performance constraints</a:t>
+            </a:r>
           </a:p>
         </p:txBody>
       </p:sp>
     </p:spTree>
     <p:extLst>
       <p:ext uri="{BB962C8B-B14F-4D97-AF65-F5344CB8AC3E}">
-        <p14:creationId xmlns:p14="http://schemas.microsoft.com/office/powerpoint/2010/main" val="2790947775"/>
+        <p14:creationId xmlns:p14="http://schemas.microsoft.com/office/powerpoint/2010/main" val="3932495684"/>
       </p:ext>
     </p:extLst>
   </p:cSld>
@@ -6462,7 +6706,7 @@
   <p:timing>
     <p:tnLst>
       <p:par>
-        <p:cTn xmlns:p14="http://schemas.microsoft.com/office/powerpoint/2010/main" id="1" dur="indefinite" restart="never" nodeType="tmRoot"/>
+        <p:cTn id="1" dur="indefinite" restart="never" nodeType="tmRoot"/>
       </p:par>
     </p:tnLst>
   </p:timing>

</xml_diff>

<commit_message>
Fix typo on slide 4
</commit_message>
<xml_diff>
--- a/slides/HotI-2011/2011-HotI-CCI-OLCF.pptx
+++ b/slides/HotI-2011/2011-HotI-CCI-OLCF.pptx
@@ -250,7 +250,7 @@
             <a:fld id="{1507BF42-67CC-4FB8-9955-9A9591B56F2B}" type="datetimeFigureOut">
               <a:rPr lang="en-US" smtClean="0"/>
               <a:pPr/>
-              <a:t>8/23/2011</a:t>
+              <a:t>8/23/11</a:t>
             </a:fld>
             <a:endParaRPr lang="en-US"/>
           </a:p>
@@ -2636,7 +2636,7 @@
   <p:timing>
     <p:tnLst>
       <p:par>
-        <p:cTn id="1" dur="indefinite" restart="never" nodeType="tmRoot"/>
+        <p:cTn xmlns:p14="http://schemas.microsoft.com/office/powerpoint/2010/main" id="1" dur="indefinite" restart="never" nodeType="tmRoot"/>
       </p:par>
     </p:tnLst>
   </p:timing>
@@ -2807,7 +2807,7 @@
   <p:timing>
     <p:tnLst>
       <p:par>
-        <p:cTn id="1" dur="indefinite" restart="never" nodeType="tmRoot"/>
+        <p:cTn xmlns:p14="http://schemas.microsoft.com/office/powerpoint/2010/main" id="1" dur="indefinite" restart="never" nodeType="tmRoot"/>
       </p:par>
     </p:tnLst>
   </p:timing>
@@ -2952,7 +2952,7 @@
   <p:timing>
     <p:tnLst>
       <p:par>
-        <p:cTn id="1" dur="indefinite" restart="never" nodeType="tmRoot"/>
+        <p:cTn xmlns:p14="http://schemas.microsoft.com/office/powerpoint/2010/main" id="1" dur="indefinite" restart="never" nodeType="tmRoot"/>
       </p:par>
     </p:tnLst>
   </p:timing>
@@ -3076,7 +3076,7 @@
   <p:timing>
     <p:tnLst>
       <p:par>
-        <p:cTn id="1" dur="indefinite" restart="never" nodeType="tmRoot"/>
+        <p:cTn xmlns:p14="http://schemas.microsoft.com/office/powerpoint/2010/main" id="1" dur="indefinite" restart="never" nodeType="tmRoot"/>
       </p:par>
     </p:tnLst>
   </p:timing>
@@ -3222,7 +3222,7 @@
   <p:timing>
     <p:tnLst>
       <p:par>
-        <p:cTn id="1" dur="indefinite" restart="never" nodeType="tmRoot"/>
+        <p:cTn xmlns:p14="http://schemas.microsoft.com/office/powerpoint/2010/main" id="1" dur="indefinite" restart="never" nodeType="tmRoot"/>
       </p:par>
     </p:tnLst>
   </p:timing>
@@ -3371,7 +3371,7 @@
   <p:timing>
     <p:tnLst>
       <p:par>
-        <p:cTn id="1" dur="indefinite" restart="never" nodeType="tmRoot"/>
+        <p:cTn xmlns:p14="http://schemas.microsoft.com/office/powerpoint/2010/main" id="1" dur="indefinite" restart="never" nodeType="tmRoot"/>
       </p:par>
     </p:tnLst>
   </p:timing>
@@ -3505,7 +3505,7 @@
   <p:timing>
     <p:tnLst>
       <p:par>
-        <p:cTn id="1" dur="indefinite" restart="never" nodeType="tmRoot"/>
+        <p:cTn xmlns:p14="http://schemas.microsoft.com/office/powerpoint/2010/main" id="1" dur="indefinite" restart="never" nodeType="tmRoot"/>
       </p:par>
     </p:tnLst>
   </p:timing>
@@ -3653,7 +3653,7 @@
   <p:timing>
     <p:tnLst>
       <p:par>
-        <p:cTn id="1" dur="indefinite" restart="never" nodeType="tmRoot"/>
+        <p:cTn xmlns:p14="http://schemas.microsoft.com/office/powerpoint/2010/main" id="1" dur="indefinite" restart="never" nodeType="tmRoot"/>
       </p:par>
     </p:tnLst>
   </p:timing>
@@ -3782,7 +3782,7 @@
   <p:timing>
     <p:tnLst>
       <p:par>
-        <p:cTn id="1" dur="indefinite" restart="never" nodeType="tmRoot"/>
+        <p:cTn xmlns:p14="http://schemas.microsoft.com/office/powerpoint/2010/main" id="1" dur="indefinite" restart="never" nodeType="tmRoot"/>
       </p:par>
     </p:tnLst>
   </p:timing>
@@ -3902,7 +3902,7 @@
   <p:timing>
     <p:tnLst>
       <p:par>
-        <p:cTn id="1" dur="indefinite" restart="never" nodeType="tmRoot"/>
+        <p:cTn xmlns:p14="http://schemas.microsoft.com/office/powerpoint/2010/main" id="1" dur="indefinite" restart="never" nodeType="tmRoot"/>
       </p:par>
     </p:tnLst>
   </p:timing>
@@ -4051,7 +4051,7 @@
   <p:timing>
     <p:tnLst>
       <p:par>
-        <p:cTn id="1" dur="indefinite" restart="never" nodeType="tmRoot"/>
+        <p:cTn xmlns:p14="http://schemas.microsoft.com/office/powerpoint/2010/main" id="1" dur="indefinite" restart="never" nodeType="tmRoot"/>
       </p:par>
     </p:tnLst>
   </p:timing>
@@ -4166,7 +4166,7 @@
   <p:timing>
     <p:tnLst>
       <p:par>
-        <p:cTn id="1" dur="indefinite" restart="never" nodeType="tmRoot"/>
+        <p:cTn xmlns:p14="http://schemas.microsoft.com/office/powerpoint/2010/main" id="1" dur="indefinite" restart="never" nodeType="tmRoot"/>
       </p:par>
     </p:tnLst>
   </p:timing>
@@ -4316,7 +4316,7 @@
   <p:timing>
     <p:tnLst>
       <p:par>
-        <p:cTn id="1" dur="indefinite" restart="never" nodeType="tmRoot"/>
+        <p:cTn xmlns:p14="http://schemas.microsoft.com/office/powerpoint/2010/main" id="1" dur="indefinite" restart="never" nodeType="tmRoot"/>
       </p:par>
     </p:tnLst>
   </p:timing>
@@ -4490,7 +4490,7 @@
   <p:timing>
     <p:tnLst>
       <p:par>
-        <p:cTn id="1" dur="indefinite" restart="never" nodeType="tmRoot"/>
+        <p:cTn xmlns:p14="http://schemas.microsoft.com/office/powerpoint/2010/main" id="1" dur="indefinite" restart="never" nodeType="tmRoot"/>
       </p:par>
     </p:tnLst>
   </p:timing>
@@ -4619,7 +4619,7 @@
   <p:timing>
     <p:tnLst>
       <p:par>
-        <p:cTn id="1" dur="indefinite" restart="never" nodeType="tmRoot"/>
+        <p:cTn xmlns:p14="http://schemas.microsoft.com/office/powerpoint/2010/main" id="1" dur="indefinite" restart="never" nodeType="tmRoot"/>
       </p:par>
     </p:tnLst>
   </p:timing>
@@ -4774,7 +4774,7 @@
   <p:timing>
     <p:tnLst>
       <p:par>
-        <p:cTn id="1" dur="indefinite" restart="never" nodeType="tmRoot"/>
+        <p:cTn xmlns:p14="http://schemas.microsoft.com/office/powerpoint/2010/main" id="1" dur="indefinite" restart="never" nodeType="tmRoot"/>
       </p:par>
     </p:tnLst>
   </p:timing>
@@ -4928,7 +4928,7 @@
   <p:timing>
     <p:tnLst>
       <p:par>
-        <p:cTn id="1" dur="indefinite" restart="never" nodeType="tmRoot"/>
+        <p:cTn xmlns:p14="http://schemas.microsoft.com/office/powerpoint/2010/main" id="1" dur="indefinite" restart="never" nodeType="tmRoot"/>
       </p:par>
     </p:tnLst>
   </p:timing>
@@ -5052,7 +5052,7 @@
   <p:timing>
     <p:tnLst>
       <p:par>
-        <p:cTn id="1" dur="indefinite" restart="never" nodeType="tmRoot"/>
+        <p:cTn xmlns:p14="http://schemas.microsoft.com/office/powerpoint/2010/main" id="1" dur="indefinite" restart="never" nodeType="tmRoot"/>
       </p:par>
     </p:tnLst>
   </p:timing>
@@ -5176,7 +5176,7 @@
   <p:timing>
     <p:tnLst>
       <p:par>
-        <p:cTn id="1" dur="indefinite" restart="never" nodeType="tmRoot"/>
+        <p:cTn xmlns:p14="http://schemas.microsoft.com/office/powerpoint/2010/main" id="1" dur="indefinite" restart="never" nodeType="tmRoot"/>
       </p:par>
     </p:tnLst>
   </p:timing>
@@ -5388,7 +5388,7 @@
   <p:timing>
     <p:tnLst>
       <p:par>
-        <p:cTn id="1" dur="indefinite" restart="never" nodeType="tmRoot"/>
+        <p:cTn xmlns:p14="http://schemas.microsoft.com/office/powerpoint/2010/main" id="1" dur="indefinite" restart="never" nodeType="tmRoot"/>
       </p:par>
     </p:tnLst>
   </p:timing>
@@ -5555,7 +5555,7 @@
   <p:timing>
     <p:tnLst>
       <p:par>
-        <p:cTn id="1" dur="indefinite" restart="never" nodeType="tmRoot"/>
+        <p:cTn xmlns:p14="http://schemas.microsoft.com/office/powerpoint/2010/main" id="1" dur="indefinite" restart="never" nodeType="tmRoot"/>
       </p:par>
     </p:tnLst>
   </p:timing>
@@ -5773,8 +5773,8 @@
               <a:t>Application </a:t>
             </a:r>
             <a:r>
-              <a:rPr lang="en-US" dirty="0" err="1" smtClean="0"/>
-              <a:t>developpers</a:t>
+              <a:rPr lang="en-US" dirty="0" smtClean="0"/>
+              <a:t>developers</a:t>
             </a:r>
             <a:r>
               <a:rPr lang="en-US" dirty="0" smtClean="0"/>
@@ -5979,7 +5979,7 @@
   <p:timing>
     <p:tnLst>
       <p:par>
-        <p:cTn id="1" dur="indefinite" restart="never" nodeType="tmRoot"/>
+        <p:cTn xmlns:p14="http://schemas.microsoft.com/office/powerpoint/2010/main" id="1" dur="indefinite" restart="never" nodeType="tmRoot"/>
       </p:par>
     </p:tnLst>
   </p:timing>
@@ -6131,7 +6131,7 @@
   <p:timing>
     <p:tnLst>
       <p:par>
-        <p:cTn id="1" dur="indefinite" restart="never" nodeType="tmRoot"/>
+        <p:cTn xmlns:p14="http://schemas.microsoft.com/office/powerpoint/2010/main" id="1" dur="indefinite" restart="never" nodeType="tmRoot"/>
       </p:par>
     </p:tnLst>
   </p:timing>
@@ -6453,7 +6453,7 @@
   <p:timing>
     <p:tnLst>
       <p:par>
-        <p:cTn id="1" dur="indefinite" restart="never" nodeType="tmRoot"/>
+        <p:cTn xmlns:p14="http://schemas.microsoft.com/office/powerpoint/2010/main" id="1" dur="indefinite" restart="never" nodeType="tmRoot"/>
       </p:par>
     </p:tnLst>
   </p:timing>
@@ -6557,7 +6557,7 @@
   <p:timing>
     <p:tnLst>
       <p:par>
-        <p:cTn id="1" dur="indefinite" restart="never" nodeType="tmRoot"/>
+        <p:cTn xmlns:p14="http://schemas.microsoft.com/office/powerpoint/2010/main" id="1" dur="indefinite" restart="never" nodeType="tmRoot"/>
       </p:par>
     </p:tnLst>
   </p:timing>
@@ -6706,7 +6706,7 @@
   <p:timing>
     <p:tnLst>
       <p:par>
-        <p:cTn id="1" dur="indefinite" restart="never" nodeType="tmRoot"/>
+        <p:cTn xmlns:p14="http://schemas.microsoft.com/office/powerpoint/2010/main" id="1" dur="indefinite" restart="never" nodeType="tmRoot"/>
       </p:par>
     </p:tnLst>
   </p:timing>

</xml_diff>

<commit_message>
a nice picture on slide 13
</commit_message>
<xml_diff>
--- a/slides/HotI-2011/2011-HotI-CCI-OLCF.pptx
+++ b/slides/HotI-2011/2011-HotI-CCI-OLCF.pptx
@@ -220,7 +220,7 @@
             </a:lvl1pPr>
           </a:lstStyle>
           <a:p>
-            <a:endParaRPr lang="en-US"/>
+            <a:endParaRPr lang="en-US" dirty="0"/>
           </a:p>
         </p:txBody>
       </p:sp>
@@ -255,7 +255,7 @@
               <a:rPr lang="en-US" smtClean="0"/>
               <a:t>8/23/11</a:t>
             </a:fld>
-            <a:endParaRPr lang="en-US"/>
+            <a:endParaRPr lang="en-US" dirty="0"/>
           </a:p>
         </p:txBody>
       </p:sp>
@@ -286,7 +286,7 @@
             </a:lvl1pPr>
           </a:lstStyle>
           <a:p>
-            <a:endParaRPr lang="en-US"/>
+            <a:endParaRPr lang="en-US" dirty="0"/>
           </a:p>
         </p:txBody>
       </p:sp>
@@ -321,7 +321,7 @@
               <a:rPr lang="en-US" smtClean="0"/>
               <a:t>‹#›</a:t>
             </a:fld>
-            <a:endParaRPr lang="en-US"/>
+            <a:endParaRPr lang="en-US" dirty="0"/>
           </a:p>
         </p:txBody>
       </p:sp>
@@ -385,7 +385,7 @@
             </a:lvl1pPr>
           </a:lstStyle>
           <a:p>
-            <a:endParaRPr lang="en-US"/>
+            <a:endParaRPr lang="en-US" dirty="0"/>
           </a:p>
         </p:txBody>
       </p:sp>
@@ -421,7 +421,7 @@
               <a:pPr/>
               <a:t>8/23/11</a:t>
             </a:fld>
-            <a:endParaRPr lang="en-US"/>
+            <a:endParaRPr lang="en-US" dirty="0"/>
           </a:p>
         </p:txBody>
       </p:sp>
@@ -454,7 +454,7 @@
           <a:bodyPr vert="horz" lIns="91440" tIns="45720" rIns="91440" bIns="45720" rtlCol="0" anchor="ctr"/>
           <a:lstStyle/>
           <a:p>
-            <a:endParaRPr lang="en-US"/>
+            <a:endParaRPr lang="en-US" dirty="0"/>
           </a:p>
         </p:txBody>
       </p:sp>
@@ -547,7 +547,7 @@
             </a:lvl1pPr>
           </a:lstStyle>
           <a:p>
-            <a:endParaRPr lang="en-US"/>
+            <a:endParaRPr lang="en-US" dirty="0"/>
           </a:p>
         </p:txBody>
       </p:sp>
@@ -583,7 +583,7 @@
               <a:pPr/>
               <a:t>‹#›</a:t>
             </a:fld>
-            <a:endParaRPr lang="en-US"/>
+            <a:endParaRPr lang="en-US" dirty="0"/>
           </a:p>
         </p:txBody>
       </p:sp>
@@ -743,14 +743,14 @@
               <a:t> to one slide for Socket an one for MPI, focusing on semantic differences. I would not present the various specialized ones, just one to show the semantic differences (matching, </a:t>
             </a:r>
             <a:r>
-              <a:rPr lang="en-US" baseline="0" dirty="0" err="1" smtClean="0"/>
-              <a:t>etc</a:t>
-            </a:r>
-            <a:r>
-              <a:rPr lang="en-US" baseline="0" smtClean="0"/>
-              <a:t>).</a:t>
-            </a:r>
-            <a:endParaRPr lang="en-US"/>
+              <a:rPr lang="en-US" baseline="0" dirty="0" smtClean="0"/>
+              <a:t>etc.)</a:t>
+            </a:r>
+            <a:r>
+              <a:rPr lang="en-US" baseline="0" dirty="0" smtClean="0"/>
+              <a:t>.</a:t>
+            </a:r>
+            <a:endParaRPr lang="en-US" dirty="0"/>
           </a:p>
         </p:txBody>
       </p:sp>
@@ -774,7 +774,7 @@
               <a:pPr/>
               <a:t>6</a:t>
             </a:fld>
-            <a:endParaRPr lang="en-US"/>
+            <a:endParaRPr lang="en-US" dirty="0"/>
           </a:p>
         </p:txBody>
       </p:sp>
@@ -850,7 +850,7 @@
           <a:lstStyle/>
           <a:p>
             <a:pPr algn="ctr"/>
-            <a:endParaRPr lang="en-US"/>
+            <a:endParaRPr lang="en-US" dirty="0"/>
           </a:p>
         </p:txBody>
       </p:sp>
@@ -2502,24 +2502,16 @@
               <a:t>Scott </a:t>
             </a:r>
             <a:r>
-              <a:rPr lang="en-US" sz="1600" b="0" dirty="0" err="1" smtClean="0"/>
-              <a:t>Atchley</a:t>
-            </a:r>
-            <a:r>
               <a:rPr lang="en-US" sz="1600" b="0" dirty="0" smtClean="0"/>
-              <a:t>, </a:t>
+              <a:t>Atchley, </a:t>
             </a:r>
             <a:r>
               <a:rPr lang="en-US" sz="1600" b="0" dirty="0"/>
               <a:t>David </a:t>
             </a:r>
             <a:r>
-              <a:rPr lang="en-US" sz="1600" b="0" dirty="0" err="1" smtClean="0"/>
-              <a:t>Dillow</a:t>
-            </a:r>
-            <a:r>
               <a:rPr lang="en-US" sz="1600" b="0" dirty="0" smtClean="0"/>
-              <a:t>, </a:t>
+              <a:t>Dillow, </a:t>
             </a:r>
             <a:r>
               <a:rPr lang="en-US" sz="1600" b="0" dirty="0"/>
@@ -2549,13 +2541,8 @@
             </a:pPr>
             <a:r>
               <a:rPr lang="en-US" sz="1600" b="0" dirty="0" smtClean="0"/>
-              <a:t>Patrick </a:t>
-            </a:r>
-            <a:r>
-              <a:rPr lang="en-US" sz="1600" b="0" dirty="0" err="1" smtClean="0"/>
-              <a:t>Geoffray</a:t>
-            </a:r>
-            <a:endParaRPr lang="en-US" sz="1600" b="0" dirty="0" smtClean="0"/>
+              <a:t>Patrick Geoffray</a:t>
+            </a:r>
           </a:p>
           <a:p>
             <a:pPr algn="ctr">
@@ -2564,10 +2551,9 @@
               </a:lnSpc>
             </a:pPr>
             <a:r>
-              <a:rPr lang="en-US" sz="1600" b="0" i="1" dirty="0" err="1" smtClean="0"/>
+              <a:rPr lang="en-US" sz="1600" b="0" i="1" dirty="0" smtClean="0"/>
               <a:t>Myricom</a:t>
             </a:r>
-            <a:endParaRPr lang="en-US" sz="1600" b="0" i="1" dirty="0" smtClean="0"/>
           </a:p>
           <a:p>
             <a:pPr algn="ctr">
@@ -2577,13 +2563,8 @@
             </a:pPr>
             <a:r>
               <a:rPr lang="en-US" sz="1600" b="0" dirty="0" smtClean="0"/>
-              <a:t>Jeffrey </a:t>
-            </a:r>
-            <a:r>
-              <a:rPr lang="en-US" sz="1600" b="0" dirty="0" err="1" smtClean="0"/>
-              <a:t>Squyres</a:t>
-            </a:r>
-            <a:endParaRPr lang="en-US" sz="1600" b="0" dirty="0" smtClean="0"/>
+              <a:t>Jeffrey Squyres</a:t>
+            </a:r>
           </a:p>
           <a:p>
             <a:pPr algn="ctr">
@@ -2607,10 +2588,9 @@
               <a:t>George </a:t>
             </a:r>
             <a:r>
-              <a:rPr lang="en-US" sz="1600" b="0" dirty="0" err="1" smtClean="0"/>
+              <a:rPr lang="en-US" sz="1600" b="0" dirty="0" smtClean="0"/>
               <a:t>Bosilca</a:t>
             </a:r>
-            <a:endParaRPr lang="en-US" sz="1600" b="0" dirty="0" smtClean="0"/>
           </a:p>
           <a:p>
             <a:pPr algn="ctr">
@@ -2631,13 +2611,8 @@
             </a:pPr>
             <a:r>
               <a:rPr lang="en-US" sz="1600" b="0" dirty="0" smtClean="0"/>
-              <a:t>Ronald </a:t>
-            </a:r>
-            <a:r>
-              <a:rPr lang="en-US" sz="1600" b="0" dirty="0" err="1" smtClean="0"/>
-              <a:t>Minnich</a:t>
-            </a:r>
-            <a:endParaRPr lang="en-US" sz="1600" b="0" dirty="0" smtClean="0"/>
+              <a:t>Ronald Minnich</a:t>
+            </a:r>
           </a:p>
           <a:p>
             <a:pPr algn="ctr">
@@ -3166,12 +3141,8 @@
           </a:p>
           <a:p>
             <a:r>
-              <a:rPr lang="en-US" dirty="0" err="1"/>
-              <a:t>Qlogics’s</a:t>
-            </a:r>
-            <a:r>
-              <a:rPr lang="en-US" dirty="0"/>
-              <a:t> </a:t>
+              <a:rPr lang="en-US" dirty="0"/>
+              <a:t>Qlogics’s </a:t>
             </a:r>
             <a:r>
               <a:rPr lang="en-US" dirty="0" smtClean="0"/>
@@ -3188,12 +3159,8 @@
           </a:p>
           <a:p>
             <a:r>
-              <a:rPr lang="en-US" dirty="0" err="1"/>
-              <a:t>Myricom’s</a:t>
-            </a:r>
-            <a:r>
-              <a:rPr lang="en-US" dirty="0"/>
-              <a:t> </a:t>
+              <a:rPr lang="en-US" dirty="0"/>
+              <a:t>Myricom’s </a:t>
             </a:r>
             <a:r>
               <a:rPr lang="en-US" dirty="0" smtClean="0"/>
@@ -3210,12 +3177,8 @@
           </a:p>
           <a:p>
             <a:r>
-              <a:rPr lang="en-US" dirty="0" err="1" smtClean="0"/>
-              <a:t>Mellanox’s</a:t>
-            </a:r>
-            <a:r>
-              <a:rPr lang="en-US" dirty="0" smtClean="0"/>
-              <a:t> MXM (unreleased)</a:t>
+              <a:rPr lang="en-US" dirty="0" smtClean="0"/>
+              <a:t>Mellanox’s MXM (unreleased)</a:t>
             </a:r>
           </a:p>
           <a:p>
@@ -3232,10 +3195,9 @@
               <a:t>LBL’s </a:t>
             </a:r>
             <a:r>
-              <a:rPr lang="en-US" dirty="0" err="1" smtClean="0"/>
+              <a:rPr lang="en-US" dirty="0" smtClean="0"/>
               <a:t>GASnet</a:t>
             </a:r>
-            <a:endParaRPr lang="en-US" dirty="0" smtClean="0"/>
           </a:p>
           <a:p>
             <a:pPr lvl="1"/>
@@ -3255,15 +3217,7 @@
             <a:pPr lvl="1"/>
             <a:r>
               <a:rPr lang="en-US" dirty="0" smtClean="0"/>
-              <a:t>Limited support outside of </a:t>
-            </a:r>
-            <a:r>
-              <a:rPr lang="en-US" dirty="0" err="1" smtClean="0"/>
-              <a:t>iWARP</a:t>
-            </a:r>
-            <a:r>
-              <a:rPr lang="en-US" dirty="0" smtClean="0"/>
-              <a:t> capable devices </a:t>
+              <a:t>Limited support outside of iWARP capable devices </a:t>
             </a:r>
             <a:endParaRPr lang="en-US" dirty="0"/>
           </a:p>
@@ -3407,6 +3361,36 @@
           </a:p>
         </p:txBody>
       </p:sp>
+      <p:pic>
+        <p:nvPicPr>
+          <p:cNvPr id="4" name="Picture 3" descr="cci_2_nodes.pdf"/>
+          <p:cNvPicPr>
+            <a:picLocks noChangeAspect="1"/>
+          </p:cNvPicPr>
+          <p:nvPr/>
+        </p:nvPicPr>
+        <p:blipFill>
+          <a:blip r:embed="rId2">
+            <a:extLst>
+              <a:ext uri="{28A0092B-C50C-407E-A947-70E740481C1C}">
+                <a14:useLocalDpi xmlns:a14="http://schemas.microsoft.com/office/drawing/2010/main" val="0"/>
+              </a:ext>
+            </a:extLst>
+          </a:blip>
+          <a:stretch>
+            <a:fillRect/>
+          </a:stretch>
+        </p:blipFill>
+        <p:spPr>
+          <a:xfrm>
+            <a:off x="3672210" y="1460500"/>
+            <a:ext cx="5293990" cy="4508500"/>
+          </a:xfrm>
+          <a:prstGeom prst="rect">
+            <a:avLst/>
+          </a:prstGeom>
+        </p:spPr>
+      </p:pic>
     </p:spTree>
     <p:extLst>
       <p:ext uri="{BB962C8B-B14F-4D97-AF65-F5344CB8AC3E}">
@@ -3511,15 +3495,7 @@
           <a:p>
             <a:r>
               <a:rPr lang="en-US" dirty="0"/>
-              <a:t>Events for send, </a:t>
-            </a:r>
-            <a:r>
-              <a:rPr lang="en-US" dirty="0" err="1"/>
-              <a:t>recv</a:t>
-            </a:r>
-            <a:r>
-              <a:rPr lang="en-US" dirty="0"/>
-              <a:t>, connection establishment, etc.</a:t>
+              <a:t>Events for send, recv, connection establishment, etc.</a:t>
             </a:r>
           </a:p>
           <a:p>
@@ -3537,7 +3513,15 @@
           <a:p>
             <a:r>
               <a:rPr lang="en-US" dirty="0"/>
-              <a:t>The process eventaully returns the event to CCI </a:t>
+              <a:t>The process </a:t>
+            </a:r>
+            <a:r>
+              <a:rPr lang="en-US" dirty="0" smtClean="0"/>
+              <a:t>eventually </a:t>
+            </a:r>
+            <a:r>
+              <a:rPr lang="en-US" dirty="0"/>
+              <a:t>returns the event to CCI </a:t>
             </a:r>
           </a:p>
           <a:p>
@@ -4271,15 +4255,7 @@
             <a:pPr lvl="2"/>
             <a:r>
               <a:rPr lang="en-US" dirty="0"/>
-              <a:t>CCI requests </a:t>
-            </a:r>
-            <a:r>
-              <a:rPr lang="en-US" dirty="0" err="1"/>
-              <a:t>acks</a:t>
-            </a:r>
-            <a:r>
-              <a:rPr lang="en-US" dirty="0"/>
-              <a:t> for reliable connections</a:t>
+              <a:t>CCI requests acks for reliable connections</a:t>
             </a:r>
           </a:p>
           <a:p>
@@ -4615,12 +4591,8 @@
           <a:p>
             <a:pPr lvl="2"/>
             <a:r>
-              <a:rPr lang="en-US" dirty="0" err="1" smtClean="0"/>
-              <a:t>Memcached</a:t>
-            </a:r>
-            <a:r>
-              <a:rPr lang="en-US" dirty="0" smtClean="0"/>
-              <a:t>, Big Table, Cassandra.</a:t>
+              <a:rPr lang="en-US" dirty="0" smtClean="0"/>
+              <a:t>Memcached, Big Table, Cassandra.</a:t>
             </a:r>
           </a:p>
           <a:p>
@@ -4897,15 +4869,7 @@
           <a:p>
             <a:r>
               <a:rPr lang="en-US" dirty="0"/>
-              <a:t>Native </a:t>
-            </a:r>
-            <a:r>
-              <a:rPr lang="en-US" dirty="0" err="1"/>
-              <a:t>SeaStar</a:t>
-            </a:r>
-            <a:r>
-              <a:rPr lang="en-US" dirty="0"/>
-              <a:t> Performance</a:t>
+              <a:t>Native SeaStar Performance</a:t>
             </a:r>
           </a:p>
         </p:txBody>
@@ -5176,15 +5140,7 @@
             <a:pPr lvl="1"/>
             <a:r>
               <a:rPr lang="en-US" dirty="0" smtClean="0"/>
-              <a:t>Work is underway to provide Cray GNI, IBM Blue Gene, and </a:t>
-            </a:r>
-            <a:r>
-              <a:rPr lang="en-US" dirty="0" err="1" smtClean="0"/>
-              <a:t>InfiniBand</a:t>
-            </a:r>
-            <a:r>
-              <a:rPr lang="en-US" dirty="0" smtClean="0"/>
-              <a:t> Verbs support	</a:t>
+              <a:t>Work is underway to provide Cray GNI, IBM Blue Gene, and InfiniBand Verbs support	</a:t>
             </a:r>
             <a:endParaRPr lang="en-US" dirty="0"/>
           </a:p>
@@ -5705,10 +5661,9 @@
                     <a:lstStyle/>
                     <a:p>
                       <a:r>
-                        <a:rPr lang="en-US" dirty="0" err="1"/>
+                        <a:rPr lang="en-US" dirty="0"/>
                         <a:t>OpenIB (Verbs)</a:t>
                       </a:r>
-                      <a:endParaRPr lang="en-US" dirty="0"/>
                     </a:p>
                   </a:txBody>
                   <a:tcPr/>
@@ -6012,20 +5967,8 @@
           </a:p>
           <a:p>
             <a:r>
-              <a:rPr lang="en-US" dirty="0" err="1"/>
-              <a:t>Lustre</a:t>
-            </a:r>
-            <a:r>
-              <a:rPr lang="en-US" dirty="0"/>
-              <a:t> distributed </a:t>
-            </a:r>
-            <a:r>
-              <a:rPr lang="en-US" dirty="0" err="1"/>
-              <a:t>file system</a:t>
-            </a:r>
-            <a:r>
-              <a:rPr lang="en-US" dirty="0"/>
-              <a:t> NAL, LNET, was originally based on Portals</a:t>
+              <a:rPr lang="en-US" dirty="0"/>
+              <a:t>Lustre distributed file system NAL, LNET, was originally based on Portals</a:t>
             </a:r>
           </a:p>
         </p:txBody>
@@ -6096,20 +6039,8 @@
           <a:lstStyle/>
           <a:p>
             <a:r>
-              <a:rPr lang="en-US" dirty="0" err="1"/>
-              <a:t>Myricom</a:t>
-            </a:r>
-            <a:r>
-              <a:rPr lang="en-US" dirty="0"/>
-              <a:t> MX and </a:t>
-            </a:r>
-            <a:r>
-              <a:rPr lang="en-US" dirty="0" err="1"/>
-              <a:t>Qlogic</a:t>
-            </a:r>
-            <a:r>
-              <a:rPr lang="en-US" dirty="0"/>
-              <a:t> PSM</a:t>
+              <a:rPr lang="en-US" dirty="0"/>
+              <a:t>Myricom MX and Qlogic PSM</a:t>
             </a:r>
           </a:p>
         </p:txBody>
@@ -6280,15 +6211,7 @@
           <a:p>
             <a:r>
               <a:rPr lang="en-US" dirty="0"/>
-              <a:t>Designed for RS-series and </a:t>
-            </a:r>
-            <a:r>
-              <a:rPr lang="en-US" dirty="0" err="1"/>
-              <a:t>BlueGene</a:t>
-            </a:r>
-            <a:r>
-              <a:rPr lang="en-US" dirty="0"/>
-              <a:t> P/Q</a:t>
+              <a:t>Designed for RS-series and BlueGene P/Q</a:t>
             </a:r>
           </a:p>
           <a:p>
@@ -7323,33 +7246,16 @@
           <a:p>
             <a:pPr lvl="1"/>
             <a:r>
-              <a:rPr lang="en-US" sz="2100" dirty="0" err="1"/>
-              <a:t>Accept</a:t>
-            </a:r>
-            <a:r>
               <a:rPr lang="en-US" sz="2100" dirty="0"/>
-              <a:t>(), </a:t>
-            </a:r>
-            <a:r>
-              <a:rPr lang="en-US" sz="2100" dirty="0" err="1"/>
-              <a:t>Connect</a:t>
-            </a:r>
+              <a:t>Accept(), Connect() immature, infrequently provided, and much less used</a:t>
+            </a:r>
+          </a:p>
+          <a:p>
+            <a:pPr lvl="1"/>
             <a:r>
               <a:rPr lang="en-US" sz="2100" dirty="0"/>
-              <a:t>() immature, infrequently provided, and much less used</a:t>
-            </a:r>
-          </a:p>
-          <a:p>
-            <a:pPr lvl="1"/>
-            <a:r>
-              <a:rPr lang="en-US" sz="2100" dirty="0"/>
-              <a:t>Imposes high overhead, not </a:t>
-            </a:r>
-            <a:r>
-              <a:rPr lang="en-US" sz="2100" dirty="0" err="1"/>
-              <a:t>performant</a:t>
-            </a:r>
-            <a:endParaRPr lang="en-US" sz="2100" dirty="0"/>
+              <a:t>Imposes high overhead, not performant</a:t>
+            </a:r>
           </a:p>
         </p:txBody>
       </p:sp>

</xml_diff>

<commit_message>
Couple of minor corrections, final version.
</commit_message>
<xml_diff>
--- a/slides/HotI-2011/2011-HotI-CCI-OLCF.pptx
+++ b/slides/HotI-2011/2011-HotI-CCI-OLCF.pptx
@@ -252,7 +252,7 @@
           <a:p>
             <a:fld id="{5290C00C-D5EF-1542-A8A4-E1D7EA8D797B}" type="datetimeFigureOut">
               <a:rPr lang="en-US" smtClean="0"/>
-              <a:t>8/24/11</a:t>
+              <a:t>8/24/2011</a:t>
             </a:fld>
             <a:endParaRPr lang="en-US" dirty="0"/>
           </a:p>
@@ -418,7 +418,7 @@
             <a:fld id="{1507BF42-67CC-4FB8-9955-9A9591B56F2B}" type="datetimeFigureOut">
               <a:rPr lang="en-US" smtClean="0"/>
               <a:pPr/>
-              <a:t>8/24/11</a:t>
+              <a:t>8/24/2011</a:t>
             </a:fld>
             <a:endParaRPr lang="en-US" dirty="0"/>
           </a:p>
@@ -4331,7 +4331,7 @@
   <p:timing>
     <p:tnLst>
       <p:par>
-        <p:cTn xmlns:p14="http://schemas.microsoft.com/office/powerpoint/2010/main" id="1" dur="indefinite" restart="never" nodeType="tmRoot"/>
+        <p:cTn id="1" dur="indefinite" restart="never" nodeType="tmRoot"/>
       </p:par>
     </p:tnLst>
   </p:timing>
@@ -4482,7 +4482,7 @@
   <p:timing>
     <p:tnLst>
       <p:par>
-        <p:cTn xmlns:p14="http://schemas.microsoft.com/office/powerpoint/2010/main" id="1" dur="indefinite" restart="never" nodeType="tmRoot"/>
+        <p:cTn id="1" dur="indefinite" restart="never" nodeType="tmRoot"/>
       </p:par>
     </p:tnLst>
   </p:timing>
@@ -4711,7 +4711,7 @@
   <p:timing>
     <p:tnLst>
       <p:par>
-        <p:cTn xmlns:p14="http://schemas.microsoft.com/office/powerpoint/2010/main" id="1" dur="indefinite" restart="never" nodeType="tmRoot"/>
+        <p:cTn id="1" dur="indefinite" restart="never" nodeType="tmRoot"/>
       </p:par>
     </p:tnLst>
   </p:timing>
@@ -4799,11 +4799,7 @@
             <a:pPr lvl="1"/>
             <a:r>
               <a:rPr lang="en-US" dirty="0" smtClean="0"/>
-              <a:t>no per-</a:t>
-            </a:r>
-            <a:r>
-              <a:rPr lang="en-US" dirty="0" smtClean="0"/>
-              <a:t>peer send/recv buffers </a:t>
+              <a:t>no per-peer send/recv buffers </a:t>
             </a:r>
           </a:p>
           <a:p>
@@ -4812,7 +4808,6 @@
               <a:rPr lang="en-US" dirty="0" smtClean="0"/>
               <a:t>no per-peer event queues </a:t>
             </a:r>
-            <a:endParaRPr lang="en-US" dirty="0" smtClean="0"/>
           </a:p>
           <a:p>
             <a:r>
@@ -4958,7 +4953,7 @@
   <p:timing>
     <p:tnLst>
       <p:par>
-        <p:cTn xmlns:p14="http://schemas.microsoft.com/office/powerpoint/2010/main" id="1" dur="indefinite" restart="never" nodeType="tmRoot"/>
+        <p:cTn id="1" dur="indefinite" restart="never" nodeType="tmRoot"/>
       </p:par>
     </p:tnLst>
   </p:timing>
@@ -5031,11 +5026,7 @@
           <a:p>
             <a:r>
               <a:rPr lang="en-US" dirty="0" smtClean="0"/>
-              <a:t>Always buffered on both send and receive </a:t>
-            </a:r>
-            <a:r>
-              <a:rPr lang="en-US" dirty="0" smtClean="0"/>
-              <a:t>side </a:t>
+              <a:t>Always buffered on both send and receive side </a:t>
             </a:r>
           </a:p>
           <a:p>
@@ -5062,7 +5053,6 @@
               <a:rPr lang="en-US" dirty="0" smtClean="0"/>
               <a:t>True handlers are the devil incarnate </a:t>
             </a:r>
-            <a:endParaRPr lang="en-US" dirty="0" smtClean="0"/>
           </a:p>
           <a:p>
             <a:pPr lvl="1"/>
@@ -5091,15 +5081,7 @@
           <a:p>
             <a:r>
               <a:rPr lang="en-US" dirty="0" smtClean="0"/>
-              <a:t>Message may be </a:t>
-            </a:r>
-            <a:r>
-              <a:rPr lang="en-US" dirty="0" smtClean="0"/>
-              <a:t>processed</a:t>
-            </a:r>
-            <a:r>
-              <a:rPr lang="en-US" dirty="0" smtClean="0"/>
-              <a:t> in</a:t>
+              <a:t>Message may be processed in</a:t>
             </a:r>
             <a:r>
               <a:rPr lang="en-US" dirty="0"/>
@@ -5116,7 +5098,6 @@
               <a:rPr lang="en-US" dirty="0" smtClean="0"/>
               <a:t>Even forwarded in-place</a:t>
             </a:r>
-            <a:endParaRPr lang="en-US" dirty="0" smtClean="0"/>
           </a:p>
           <a:p>
             <a:r>
@@ -5172,7 +5153,7 @@
   <p:timing>
     <p:tnLst>
       <p:par>
-        <p:cTn xmlns:p14="http://schemas.microsoft.com/office/powerpoint/2010/main" id="1" dur="indefinite" restart="never" nodeType="tmRoot"/>
+        <p:cTn id="1" dur="indefinite" restart="never" nodeType="tmRoot"/>
       </p:par>
     </p:tnLst>
   </p:timing>
@@ -5246,15 +5227,7 @@
           <a:p>
             <a:r>
               <a:rPr lang="en-US" dirty="0" smtClean="0"/>
-              <a:t>RMA </a:t>
-            </a:r>
-            <a:r>
-              <a:rPr lang="en-US" dirty="0" smtClean="0"/>
-              <a:t>communication </a:t>
-            </a:r>
-            <a:r>
-              <a:rPr lang="en-US" dirty="0" smtClean="0"/>
-              <a:t>for bulk-data transfer</a:t>
+              <a:t>RMA communication for bulk-data transfer</a:t>
             </a:r>
           </a:p>
           <a:p>
@@ -5361,7 +5334,7 @@
   <p:timing>
     <p:tnLst>
       <p:par>
-        <p:cTn xmlns:p14="http://schemas.microsoft.com/office/powerpoint/2010/main" id="1" dur="indefinite" restart="never" nodeType="tmRoot"/>
+        <p:cTn id="1" dur="indefinite" restart="never" nodeType="tmRoot"/>
       </p:par>
     </p:tnLst>
   </p:timing>
@@ -5565,7 +5538,7 @@
   <p:timing>
     <p:tnLst>
       <p:par>
-        <p:cTn xmlns:p14="http://schemas.microsoft.com/office/powerpoint/2010/main" id="1" dur="indefinite" restart="never" nodeType="tmRoot"/>
+        <p:cTn id="1" dur="indefinite" restart="never" nodeType="tmRoot"/>
       </p:par>
     </p:tnLst>
   </p:timing>
@@ -5689,7 +5662,7 @@
   <p:timing>
     <p:tnLst>
       <p:par>
-        <p:cTn xmlns:p14="http://schemas.microsoft.com/office/powerpoint/2010/main" id="1" dur="indefinite" restart="never" nodeType="tmRoot"/>
+        <p:cTn id="1" dur="indefinite" restart="never" nodeType="tmRoot"/>
       </p:par>
     </p:tnLst>
   </p:timing>
@@ -5813,7 +5786,7 @@
   <p:timing>
     <p:tnLst>
       <p:par>
-        <p:cTn xmlns:p14="http://schemas.microsoft.com/office/powerpoint/2010/main" id="1" dur="indefinite" restart="never" nodeType="tmRoot"/>
+        <p:cTn id="1" dur="indefinite" restart="never" nodeType="tmRoot"/>
       </p:par>
     </p:tnLst>
   </p:timing>
@@ -6017,7 +5990,7 @@
   <p:timing>
     <p:tnLst>
       <p:par>
-        <p:cTn xmlns:p14="http://schemas.microsoft.com/office/powerpoint/2010/main" id="1" dur="indefinite" restart="never" nodeType="tmRoot"/>
+        <p:cTn id="1" dur="indefinite" restart="never" nodeType="tmRoot"/>
       </p:par>
     </p:tnLst>
   </p:timing>
@@ -6449,7 +6422,7 @@
   <p:timing>
     <p:tnLst>
       <p:par>
-        <p:cTn xmlns:p14="http://schemas.microsoft.com/office/powerpoint/2010/main" id="1" dur="indefinite" restart="never" nodeType="tmRoot"/>
+        <p:cTn id="1" dur="indefinite" restart="never" nodeType="tmRoot"/>
       </p:par>
     </p:tnLst>
   </p:timing>
@@ -6552,7 +6525,23 @@
             <a:pPr lvl="1"/>
             <a:r>
               <a:rPr lang="en-US" dirty="0"/>
-              <a:t>Portable, simple network interface</a:t>
+              <a:t>Portable, </a:t>
+            </a:r>
+            <a:r>
+              <a:rPr lang="en-US"/>
+              <a:t>simple </a:t>
+            </a:r>
+            <a:r>
+              <a:rPr lang="en-US" smtClean="0"/>
+              <a:t>programing</a:t>
+            </a:r>
+            <a:r>
+              <a:rPr lang="en-US" smtClean="0"/>
+              <a:t> </a:t>
+            </a:r>
+            <a:r>
+              <a:rPr lang="en-US" dirty="0"/>
+              <a:t>interface</a:t>
             </a:r>
           </a:p>
           <a:p>
@@ -6586,7 +6575,19 @@
             <a:pPr lvl="1"/>
             <a:r>
               <a:rPr lang="en-US" dirty="0"/>
-              <a:t>Uses RMA for bulk movement and zero-copy semantics</a:t>
+              <a:t>Uses RMA for bulk movement and </a:t>
+            </a:r>
+            <a:r>
+              <a:rPr lang="en-US" dirty="0" smtClean="0"/>
+              <a:t>one-sided</a:t>
+            </a:r>
+            <a:r>
+              <a:rPr lang="en-US" dirty="0" smtClean="0"/>
+              <a:t> </a:t>
+            </a:r>
+            <a:r>
+              <a:rPr lang="en-US" dirty="0"/>
+              <a:t>semantics</a:t>
             </a:r>
           </a:p>
           <a:p>
@@ -6647,7 +6648,7 @@
   <p:timing>
     <p:tnLst>
       <p:par>
-        <p:cTn xmlns:p14="http://schemas.microsoft.com/office/powerpoint/2010/main" id="1" dur="indefinite" restart="never" nodeType="tmRoot"/>
+        <p:cTn id="1" dur="indefinite" restart="never" nodeType="tmRoot"/>
       </p:par>
     </p:tnLst>
   </p:timing>
@@ -7021,7 +7022,7 @@
   <p:timing>
     <p:tnLst>
       <p:par>
-        <p:cTn xmlns:p14="http://schemas.microsoft.com/office/powerpoint/2010/main" id="1" dur="indefinite" restart="never" nodeType="tmRoot"/>
+        <p:cTn id="1" dur="indefinite" restart="never" nodeType="tmRoot"/>
       </p:par>
     </p:tnLst>
   </p:timing>
@@ -7350,7 +7351,7 @@
   <p:timing>
     <p:tnLst>
       <p:par>
-        <p:cTn xmlns:p14="http://schemas.microsoft.com/office/powerpoint/2010/main" id="1" dur="indefinite" restart="never" nodeType="tmRoot"/>
+        <p:cTn id="1" dur="indefinite" restart="never" nodeType="tmRoot"/>
       </p:par>
     </p:tnLst>
   </p:timing>
@@ -7507,7 +7508,7 @@
   <p:timing>
     <p:tnLst>
       <p:par>
-        <p:cTn xmlns:p14="http://schemas.microsoft.com/office/powerpoint/2010/main" id="1" dur="indefinite" restart="never" nodeType="tmRoot"/>
+        <p:cTn id="1" dur="indefinite" restart="never" nodeType="tmRoot"/>
       </p:par>
     </p:tnLst>
   </p:timing>
@@ -7637,7 +7638,7 @@
   <p:timing>
     <p:tnLst>
       <p:par>
-        <p:cTn xmlns:p14="http://schemas.microsoft.com/office/powerpoint/2010/main" id="1" dur="indefinite" restart="never" nodeType="tmRoot"/>
+        <p:cTn id="1" dur="indefinite" restart="never" nodeType="tmRoot"/>
       </p:par>
     </p:tnLst>
   </p:timing>
@@ -7781,7 +7782,7 @@
   <p:timing>
     <p:tnLst>
       <p:par>
-        <p:cTn xmlns:p14="http://schemas.microsoft.com/office/powerpoint/2010/main" id="1" dur="indefinite" restart="never" nodeType="tmRoot"/>
+        <p:cTn id="1" dur="indefinite" restart="never" nodeType="tmRoot"/>
       </p:par>
     </p:tnLst>
   </p:timing>
@@ -7910,7 +7911,7 @@
   <p:timing>
     <p:tnLst>
       <p:par>
-        <p:cTn xmlns:p14="http://schemas.microsoft.com/office/powerpoint/2010/main" id="1" dur="indefinite" restart="never" nodeType="tmRoot"/>
+        <p:cTn id="1" dur="indefinite" restart="never" nodeType="tmRoot"/>
       </p:par>
     </p:tnLst>
   </p:timing>
@@ -8096,11 +8097,7 @@
             </a:r>
             <a:r>
               <a:rPr lang="en-US" dirty="0" smtClean="0"/>
-              <a:t>revenue for niche applications</a:t>
-            </a:r>
-            <a:r>
-              <a:rPr lang="en-US" dirty="0" smtClean="0"/>
-              <a:t>.</a:t>
+              <a:t>revenue for niche applications.</a:t>
             </a:r>
           </a:p>
         </p:txBody>
@@ -8118,7 +8115,7 @@
   <p:timing>
     <p:tnLst>
       <p:par>
-        <p:cTn xmlns:p14="http://schemas.microsoft.com/office/powerpoint/2010/main" id="1" dur="indefinite" restart="never" nodeType="tmRoot"/>
+        <p:cTn id="1" dur="indefinite" restart="never" nodeType="tmRoot"/>
       </p:par>
     </p:tnLst>
   </p:timing>
@@ -8278,7 +8275,7 @@
   <p:timing>
     <p:tnLst>
       <p:par>
-        <p:cTn xmlns:p14="http://schemas.microsoft.com/office/powerpoint/2010/main" id="1" dur="indefinite" restart="never" nodeType="tmRoot"/>
+        <p:cTn id="1" dur="indefinite" restart="never" nodeType="tmRoot"/>
       </p:par>
     </p:tnLst>
   </p:timing>
@@ -8449,7 +8446,7 @@
   <p:timing>
     <p:tnLst>
       <p:par>
-        <p:cTn xmlns:p14="http://schemas.microsoft.com/office/powerpoint/2010/main" id="1" dur="indefinite" restart="never" nodeType="tmRoot"/>
+        <p:cTn id="1" dur="indefinite" restart="never" nodeType="tmRoot"/>
       </p:par>
     </p:tnLst>
   </p:timing>
@@ -8726,7 +8723,7 @@
   <p:timing>
     <p:tnLst>
       <p:par>
-        <p:cTn xmlns:p14="http://schemas.microsoft.com/office/powerpoint/2010/main" id="1" dur="indefinite" restart="never" nodeType="tmRoot"/>
+        <p:cTn id="1" dur="indefinite" restart="never" nodeType="tmRoot"/>
       </p:par>
     </p:tnLst>
   </p:timing>
@@ -9680,7 +9677,7 @@
   <p:timing>
     <p:tnLst>
       <p:par>
-        <p:cTn xmlns:p14="http://schemas.microsoft.com/office/powerpoint/2010/main" id="1" dur="indefinite" restart="never" nodeType="tmRoot"/>
+        <p:cTn id="1" dur="indefinite" restart="never" nodeType="tmRoot"/>
       </p:par>
     </p:tnLst>
   </p:timing>
@@ -9859,11 +9856,7 @@
             </a:r>
             <a:r>
               <a:rPr lang="en-US" dirty="0" smtClean="0"/>
-              <a:t>cost</a:t>
-            </a:r>
-            <a:r>
-              <a:rPr lang="en-US" dirty="0" smtClean="0"/>
-              <a:t>.</a:t>
+              <a:t>cost.</a:t>
             </a:r>
           </a:p>
           <a:p>
@@ -9934,7 +9927,7 @@
   <p:timing>
     <p:tnLst>
       <p:par>
-        <p:cTn xmlns:p14="http://schemas.microsoft.com/office/powerpoint/2010/main" id="1" dur="indefinite" restart="never" nodeType="tmRoot"/>
+        <p:cTn id="1" dur="indefinite" restart="never" nodeType="tmRoot"/>
       </p:par>
     </p:tnLst>
   </p:timing>

</xml_diff>